<commit_message>
diagram qrcode , refund napas
</commit_message>
<xml_diff>
--- a/TaiLieu/NAPAS-Thanh toan dien tu - Copy.pptx
+++ b/TaiLieu/NAPAS-Thanh toan dien tu - Copy.pptx
@@ -7,15 +7,18 @@
     <p:sldMasterId id="2147483781" r:id="rId3"/>
   </p:sldMasterIdLst>
   <p:notesMasterIdLst>
-    <p:notesMasterId r:id="rId10"/>
+    <p:notesMasterId r:id="rId13"/>
   </p:notesMasterIdLst>
   <p:sldIdLst>
     <p:sldId id="377" r:id="rId4"/>
     <p:sldId id="463" r:id="rId5"/>
     <p:sldId id="467" r:id="rId6"/>
-    <p:sldId id="466" r:id="rId7"/>
-    <p:sldId id="464" r:id="rId8"/>
-    <p:sldId id="465" r:id="rId9"/>
+    <p:sldId id="468" r:id="rId7"/>
+    <p:sldId id="469" r:id="rId8"/>
+    <p:sldId id="466" r:id="rId9"/>
+    <p:sldId id="464" r:id="rId10"/>
+    <p:sldId id="470" r:id="rId11"/>
+    <p:sldId id="465" r:id="rId12"/>
   </p:sldIdLst>
   <p:sldSz cx="12192000" cy="6858000"/>
   <p:notesSz cx="6858000" cy="9144000"/>
@@ -724,6 +727,53 @@
           <a:lstStyle/>
           <a:p>
             <a:r>
+              <a:rPr lang="vi-VN" sz="1200" b="0" i="0" kern="1200" dirty="0" smtClean="0">
+                <a:solidFill>
+                  <a:schemeClr val="tx1"/>
+                </a:solidFill>
+                <a:effectLst/>
+                <a:latin typeface="+mn-lt"/>
+                <a:ea typeface="+mn-ea"/>
+                <a:cs typeface="+mn-cs"/>
+              </a:rPr>
+              <a:t>QR code được cấu tạo gồm 1 hình vuông, 3 trong 4 góc của hình vuông được đặt ký hiệu ngăn cách, nhờ thế phạm vi của QR code có thể được nhận biết rõ ràng và được đọc với tốc độ nhanh chóng ở bất cứ góc độ nào, nhờ đó chúng ta sẽ không phải đối diện với tình cảnh phải không ngừng thay đổi góc độ của camera điện thoại mà mãi vẫn không đọc được mã nữa! </a:t>
+            </a:r>
+            <a:r>
+              <a:rPr lang="en-US" sz="1200" b="0" i="0" kern="1200" dirty="0" smtClean="0">
+                <a:solidFill>
+                  <a:schemeClr val="tx1"/>
+                </a:solidFill>
+                <a:effectLst/>
+                <a:latin typeface="+mn-lt"/>
+                <a:ea typeface="+mn-ea"/>
+                <a:cs typeface="+mn-cs"/>
+              </a:rPr>
+              <a:t/>
+            </a:r>
+            <a:br>
+              <a:rPr lang="en-US" sz="1200" b="0" i="0" kern="1200" dirty="0" smtClean="0">
+                <a:solidFill>
+                  <a:schemeClr val="tx1"/>
+                </a:solidFill>
+                <a:effectLst/>
+                <a:latin typeface="+mn-lt"/>
+                <a:ea typeface="+mn-ea"/>
+                <a:cs typeface="+mn-cs"/>
+              </a:rPr>
+            </a:br>
+            <a:r>
+              <a:rPr lang="vi-VN" sz="1200" b="0" i="0" kern="1200" dirty="0" smtClean="0">
+                <a:solidFill>
+                  <a:schemeClr val="tx1"/>
+                </a:solidFill>
+                <a:effectLst/>
+                <a:latin typeface="+mn-lt"/>
+                <a:ea typeface="+mn-ea"/>
+                <a:cs typeface="+mn-cs"/>
+              </a:rPr>
+              <a:t>do </a:t>
+            </a:r>
+            <a:r>
               <a:rPr lang="vi-VN" sz="1200" b="0" i="0" kern="1200" dirty="0">
                 <a:solidFill>
                   <a:schemeClr val="tx1"/>
@@ -733,7 +783,7 @@
                 <a:ea typeface="+mn-ea"/>
                 <a:cs typeface="+mn-cs"/>
               </a:rPr>
-              <a:t>do vậy nó được sử dụng rất nhiều trong việc kinh doanh sản xuất nhiều loại mặt hàng khác nhau.</a:t>
+              <a:t>vậy nó được sử dụng rất nhiều trong việc kinh doanh sản xuất nhiều loại mặt hàng khác nhau.</a:t>
             </a:r>
             <a:endParaRPr lang="en-US" dirty="0"/>
           </a:p>
@@ -766,6 +816,525 @@
     <p:extLst>
       <p:ext uri="{BB962C8B-B14F-4D97-AF65-F5344CB8AC3E}">
         <p14:creationId xmlns:p14="http://schemas.microsoft.com/office/powerpoint/2010/main" val="1845516402"/>
+      </p:ext>
+    </p:extLst>
+  </p:cSld>
+  <p:clrMapOvr>
+    <a:masterClrMapping/>
+  </p:clrMapOvr>
+</p:notes>
+</file>
+
+<file path=ppt/notesSlides/notesSlide4.xml><?xml version="1.0" encoding="utf-8"?>
+<p:notes xmlns:a="http://schemas.openxmlformats.org/drawingml/2006/main" xmlns:r="http://schemas.openxmlformats.org/officeDocument/2006/relationships" xmlns:p="http://schemas.openxmlformats.org/presentationml/2006/main">
+  <p:cSld>
+    <p:spTree>
+      <p:nvGrpSpPr>
+        <p:cNvPr id="1" name=""/>
+        <p:cNvGrpSpPr/>
+        <p:nvPr/>
+      </p:nvGrpSpPr>
+      <p:grpSpPr>
+        <a:xfrm>
+          <a:off x="0" y="0"/>
+          <a:ext cx="0" cy="0"/>
+          <a:chOff x="0" y="0"/>
+          <a:chExt cx="0" cy="0"/>
+        </a:xfrm>
+      </p:grpSpPr>
+      <p:sp>
+        <p:nvSpPr>
+          <p:cNvPr id="2" name="Slide Image Placeholder 1"/>
+          <p:cNvSpPr>
+            <a:spLocks noGrp="1" noRot="1" noChangeAspect="1"/>
+          </p:cNvSpPr>
+          <p:nvPr>
+            <p:ph type="sldImg"/>
+          </p:nvPr>
+        </p:nvSpPr>
+        <p:spPr/>
+      </p:sp>
+      <p:sp>
+        <p:nvSpPr>
+          <p:cNvPr id="3" name="Notes Placeholder 2"/>
+          <p:cNvSpPr>
+            <a:spLocks noGrp="1"/>
+          </p:cNvSpPr>
+          <p:nvPr>
+            <p:ph type="body" idx="1"/>
+          </p:nvPr>
+        </p:nvSpPr>
+        <p:spPr/>
+        <p:txBody>
+          <a:bodyPr/>
+          <a:lstStyle/>
+          <a:p>
+            <a:r>
+              <a:rPr lang="vi-VN" sz="1200" b="0" i="0" kern="1200" dirty="0" smtClean="0">
+                <a:solidFill>
+                  <a:schemeClr val="tx1"/>
+                </a:solidFill>
+                <a:effectLst/>
+                <a:latin typeface="+mn-lt"/>
+                <a:ea typeface="+mn-ea"/>
+                <a:cs typeface="+mn-cs"/>
+              </a:rPr>
+              <a:t>mà không cần máy đọc mã chuyên dụng. Để đọc được mã vạch truyền thống, ta cần có sensor chuyên dụng như đầu đọc lazer giống với loại máy chuyên dụng thường thấy trong các siêu thị hay cửa hàng tiện lợi. Với QR code, ta có thể tiết kiệm được chi phí đầu tư ban đầu này.</a:t>
+            </a:r>
+            <a:r>
+              <a:rPr lang="en-US" sz="1200" b="0" i="0" kern="1200" dirty="0" smtClean="0">
+                <a:solidFill>
+                  <a:schemeClr val="tx1"/>
+                </a:solidFill>
+                <a:effectLst/>
+                <a:latin typeface="+mn-lt"/>
+                <a:ea typeface="+mn-ea"/>
+                <a:cs typeface="+mn-cs"/>
+              </a:rPr>
+              <a:t/>
+            </a:r>
+            <a:br>
+              <a:rPr lang="en-US" sz="1200" b="0" i="0" kern="1200" dirty="0" smtClean="0">
+                <a:solidFill>
+                  <a:schemeClr val="tx1"/>
+                </a:solidFill>
+                <a:effectLst/>
+                <a:latin typeface="+mn-lt"/>
+                <a:ea typeface="+mn-ea"/>
+                <a:cs typeface="+mn-cs"/>
+              </a:rPr>
+            </a:br>
+            <a:r>
+              <a:rPr lang="en-US" sz="1200" b="0" i="0" kern="1200" dirty="0" smtClean="0">
+                <a:solidFill>
+                  <a:schemeClr val="tx1"/>
+                </a:solidFill>
+                <a:effectLst/>
+                <a:latin typeface="+mn-lt"/>
+                <a:ea typeface="+mn-ea"/>
+                <a:cs typeface="+mn-cs"/>
+              </a:rPr>
+              <a:t/>
+            </a:r>
+            <a:br>
+              <a:rPr lang="en-US" sz="1200" b="0" i="0" kern="1200" dirty="0" smtClean="0">
+                <a:solidFill>
+                  <a:schemeClr val="tx1"/>
+                </a:solidFill>
+                <a:effectLst/>
+                <a:latin typeface="+mn-lt"/>
+                <a:ea typeface="+mn-ea"/>
+                <a:cs typeface="+mn-cs"/>
+              </a:rPr>
+            </a:br>
+            <a:r>
+              <a:rPr lang="vi-VN" sz="1200" b="0" i="0" kern="1200" dirty="0" smtClean="0">
+                <a:solidFill>
+                  <a:schemeClr val="tx1"/>
+                </a:solidFill>
+                <a:effectLst/>
+                <a:latin typeface="+mn-lt"/>
+                <a:ea typeface="+mn-ea"/>
+                <a:cs typeface="+mn-cs"/>
+              </a:rPr>
+              <a:t>do </a:t>
+            </a:r>
+            <a:r>
+              <a:rPr lang="vi-VN" sz="1200" b="0" i="0" kern="1200" dirty="0">
+                <a:solidFill>
+                  <a:schemeClr val="tx1"/>
+                </a:solidFill>
+                <a:effectLst/>
+                <a:latin typeface="+mn-lt"/>
+                <a:ea typeface="+mn-ea"/>
+                <a:cs typeface="+mn-cs"/>
+              </a:rPr>
+              <a:t>vậy nó được sử dụng rất nhiều trong việc kinh doanh sản xuất nhiều loại mặt hàng khác nhau.</a:t>
+            </a:r>
+            <a:endParaRPr lang="en-US" dirty="0"/>
+          </a:p>
+        </p:txBody>
+      </p:sp>
+      <p:sp>
+        <p:nvSpPr>
+          <p:cNvPr id="4" name="Slide Number Placeholder 3"/>
+          <p:cNvSpPr>
+            <a:spLocks noGrp="1"/>
+          </p:cNvSpPr>
+          <p:nvPr>
+            <p:ph type="sldNum" sz="quarter" idx="5"/>
+          </p:nvPr>
+        </p:nvSpPr>
+        <p:spPr/>
+        <p:txBody>
+          <a:bodyPr/>
+          <a:lstStyle/>
+          <a:p>
+            <a:fld id="{ED1DD8EE-9F9D-40C1-B36B-2569414F89B1}" type="slidenum">
+              <a:rPr lang="en-US" smtClean="0"/>
+              <a:t>4</a:t>
+            </a:fld>
+            <a:endParaRPr lang="en-US"/>
+          </a:p>
+        </p:txBody>
+      </p:sp>
+    </p:spTree>
+    <p:extLst>
+      <p:ext uri="{BB962C8B-B14F-4D97-AF65-F5344CB8AC3E}">
+        <p14:creationId xmlns:p14="http://schemas.microsoft.com/office/powerpoint/2010/main" val="398320128"/>
+      </p:ext>
+    </p:extLst>
+  </p:cSld>
+  <p:clrMapOvr>
+    <a:masterClrMapping/>
+  </p:clrMapOvr>
+</p:notes>
+</file>
+
+<file path=ppt/notesSlides/notesSlide5.xml><?xml version="1.0" encoding="utf-8"?>
+<p:notes xmlns:a="http://schemas.openxmlformats.org/drawingml/2006/main" xmlns:r="http://schemas.openxmlformats.org/officeDocument/2006/relationships" xmlns:p="http://schemas.openxmlformats.org/presentationml/2006/main">
+  <p:cSld>
+    <p:spTree>
+      <p:nvGrpSpPr>
+        <p:cNvPr id="1" name=""/>
+        <p:cNvGrpSpPr/>
+        <p:nvPr/>
+      </p:nvGrpSpPr>
+      <p:grpSpPr>
+        <a:xfrm>
+          <a:off x="0" y="0"/>
+          <a:ext cx="0" cy="0"/>
+          <a:chOff x="0" y="0"/>
+          <a:chExt cx="0" cy="0"/>
+        </a:xfrm>
+      </p:grpSpPr>
+      <p:sp>
+        <p:nvSpPr>
+          <p:cNvPr id="2" name="Slide Image Placeholder 1"/>
+          <p:cNvSpPr>
+            <a:spLocks noGrp="1" noRot="1" noChangeAspect="1"/>
+          </p:cNvSpPr>
+          <p:nvPr>
+            <p:ph type="sldImg"/>
+          </p:nvPr>
+        </p:nvSpPr>
+        <p:spPr/>
+      </p:sp>
+      <p:sp>
+        <p:nvSpPr>
+          <p:cNvPr id="3" name="Notes Placeholder 2"/>
+          <p:cNvSpPr>
+            <a:spLocks noGrp="1"/>
+          </p:cNvSpPr>
+          <p:nvPr>
+            <p:ph type="body" idx="1"/>
+          </p:nvPr>
+        </p:nvSpPr>
+        <p:spPr/>
+        <p:txBody>
+          <a:bodyPr/>
+          <a:lstStyle/>
+          <a:p>
+            <a:endParaRPr lang="en-US" dirty="0"/>
+          </a:p>
+        </p:txBody>
+      </p:sp>
+      <p:sp>
+        <p:nvSpPr>
+          <p:cNvPr id="4" name="Slide Number Placeholder 3"/>
+          <p:cNvSpPr>
+            <a:spLocks noGrp="1"/>
+          </p:cNvSpPr>
+          <p:nvPr>
+            <p:ph type="sldNum" sz="quarter" idx="5"/>
+          </p:nvPr>
+        </p:nvSpPr>
+        <p:spPr/>
+        <p:txBody>
+          <a:bodyPr/>
+          <a:lstStyle/>
+          <a:p>
+            <a:fld id="{ED1DD8EE-9F9D-40C1-B36B-2569414F89B1}" type="slidenum">
+              <a:rPr lang="en-US" smtClean="0"/>
+              <a:t>5</a:t>
+            </a:fld>
+            <a:endParaRPr lang="en-US"/>
+          </a:p>
+        </p:txBody>
+      </p:sp>
+    </p:spTree>
+    <p:extLst>
+      <p:ext uri="{BB962C8B-B14F-4D97-AF65-F5344CB8AC3E}">
+        <p14:creationId xmlns:p14="http://schemas.microsoft.com/office/powerpoint/2010/main" val="862180768"/>
+      </p:ext>
+    </p:extLst>
+  </p:cSld>
+  <p:clrMapOvr>
+    <a:masterClrMapping/>
+  </p:clrMapOvr>
+</p:notes>
+</file>
+
+<file path=ppt/notesSlides/notesSlide6.xml><?xml version="1.0" encoding="utf-8"?>
+<p:notes xmlns:a="http://schemas.openxmlformats.org/drawingml/2006/main" xmlns:r="http://schemas.openxmlformats.org/officeDocument/2006/relationships" xmlns:p="http://schemas.openxmlformats.org/presentationml/2006/main">
+  <p:cSld>
+    <p:spTree>
+      <p:nvGrpSpPr>
+        <p:cNvPr id="1" name=""/>
+        <p:cNvGrpSpPr/>
+        <p:nvPr/>
+      </p:nvGrpSpPr>
+      <p:grpSpPr>
+        <a:xfrm>
+          <a:off x="0" y="0"/>
+          <a:ext cx="0" cy="0"/>
+          <a:chOff x="0" y="0"/>
+          <a:chExt cx="0" cy="0"/>
+        </a:xfrm>
+      </p:grpSpPr>
+      <p:sp>
+        <p:nvSpPr>
+          <p:cNvPr id="2" name="Slide Image Placeholder 1"/>
+          <p:cNvSpPr>
+            <a:spLocks noGrp="1" noRot="1" noChangeAspect="1"/>
+          </p:cNvSpPr>
+          <p:nvPr>
+            <p:ph type="sldImg"/>
+          </p:nvPr>
+        </p:nvSpPr>
+        <p:spPr/>
+      </p:sp>
+      <p:sp>
+        <p:nvSpPr>
+          <p:cNvPr id="3" name="Notes Placeholder 2"/>
+          <p:cNvSpPr>
+            <a:spLocks noGrp="1"/>
+          </p:cNvSpPr>
+          <p:nvPr>
+            <p:ph type="body" idx="1"/>
+          </p:nvPr>
+        </p:nvSpPr>
+        <p:spPr/>
+        <p:txBody>
+          <a:bodyPr/>
+          <a:lstStyle/>
+          <a:p>
+            <a:r>
+              <a:rPr lang="en-US" sz="1200" b="0" i="0" u="none" strike="noStrike" kern="1200" dirty="0" smtClean="0">
+                <a:solidFill>
+                  <a:schemeClr val="tx1"/>
+                </a:solidFill>
+                <a:effectLst/>
+                <a:latin typeface="+mn-lt"/>
+                <a:ea typeface="+mn-ea"/>
+                <a:cs typeface="+mn-cs"/>
+              </a:rPr>
+              <a:t/>
+            </a:r>
+            <a:br>
+              <a:rPr lang="en-US" sz="1200" b="0" i="0" u="none" strike="noStrike" kern="1200" dirty="0" smtClean="0">
+                <a:solidFill>
+                  <a:schemeClr val="tx1"/>
+                </a:solidFill>
+                <a:effectLst/>
+                <a:latin typeface="+mn-lt"/>
+                <a:ea typeface="+mn-ea"/>
+                <a:cs typeface="+mn-cs"/>
+              </a:rPr>
+            </a:br>
+            <a:r>
+              <a:rPr lang="vi-VN" sz="1200" b="0" i="0" kern="1200" dirty="0" smtClean="0">
+                <a:solidFill>
+                  <a:schemeClr val="tx1"/>
+                </a:solidFill>
+                <a:effectLst/>
+                <a:latin typeface="+mn-lt"/>
+                <a:ea typeface="+mn-ea"/>
+                <a:cs typeface="+mn-cs"/>
+              </a:rPr>
+              <a:t>Trong trường hợp Đơn vị chấp nhận thanh toán (ĐVCNTT) không có hàng hóa, dịch vụ để bán cho khách hàng hoặc hàng hóa, dịch vụ bị trả lại, hủy bỏ hoặc có sự điều chỉnh giá cả hàng hóa/dịch vụ, ĐVCNTT phải thực hiện thay thế hay điều chỉnh cho khách hàng bằng các chuyển yêu cầu hoàn trả lại tiền cho khách hàng qua hệ thống của VNPAY để thực hiện ghi có tài khoản cho chủ thẻ.</a:t>
+            </a:r>
+            <a:r>
+              <a:rPr lang="en-US" sz="1200" b="0" i="0" u="none" strike="noStrike" kern="1200" dirty="0" smtClean="0">
+                <a:solidFill>
+                  <a:schemeClr val="tx1"/>
+                </a:solidFill>
+                <a:effectLst/>
+                <a:latin typeface="+mn-lt"/>
+                <a:ea typeface="+mn-ea"/>
+                <a:cs typeface="+mn-cs"/>
+              </a:rPr>
+              <a:t/>
+            </a:r>
+            <a:br>
+              <a:rPr lang="en-US" sz="1200" b="0" i="0" u="none" strike="noStrike" kern="1200" dirty="0" smtClean="0">
+                <a:solidFill>
+                  <a:schemeClr val="tx1"/>
+                </a:solidFill>
+                <a:effectLst/>
+                <a:latin typeface="+mn-lt"/>
+                <a:ea typeface="+mn-ea"/>
+                <a:cs typeface="+mn-cs"/>
+              </a:rPr>
+            </a:br>
+            <a:r>
+              <a:rPr lang="vi-VN" sz="1200" b="0" i="0" u="none" strike="noStrike" kern="1200" dirty="0" smtClean="0">
+                <a:solidFill>
+                  <a:schemeClr val="tx1"/>
+                </a:solidFill>
+                <a:effectLst/>
+                <a:latin typeface="+mn-lt"/>
+                <a:ea typeface="+mn-ea"/>
+                <a:cs typeface="+mn-cs"/>
+              </a:rPr>
+              <a:t>Người bán có thể thực hiện bất kỳ số lượng giao dịch hoàn tiền nào trên giao dịch ban đầu</a:t>
+            </a:r>
+            <a:endParaRPr lang="en-US" dirty="0"/>
+          </a:p>
+        </p:txBody>
+      </p:sp>
+      <p:sp>
+        <p:nvSpPr>
+          <p:cNvPr id="4" name="Slide Number Placeholder 3"/>
+          <p:cNvSpPr>
+            <a:spLocks noGrp="1"/>
+          </p:cNvSpPr>
+          <p:nvPr>
+            <p:ph type="sldNum" sz="quarter" idx="10"/>
+          </p:nvPr>
+        </p:nvSpPr>
+        <p:spPr/>
+        <p:txBody>
+          <a:bodyPr/>
+          <a:lstStyle/>
+          <a:p>
+            <a:fld id="{ED1DD8EE-9F9D-40C1-B36B-2569414F89B1}" type="slidenum">
+              <a:rPr lang="en-US" smtClean="0"/>
+              <a:t>6</a:t>
+            </a:fld>
+            <a:endParaRPr lang="en-US"/>
+          </a:p>
+        </p:txBody>
+      </p:sp>
+    </p:spTree>
+    <p:extLst>
+      <p:ext uri="{BB962C8B-B14F-4D97-AF65-F5344CB8AC3E}">
+        <p14:creationId xmlns:p14="http://schemas.microsoft.com/office/powerpoint/2010/main" val="1850984755"/>
+      </p:ext>
+    </p:extLst>
+  </p:cSld>
+  <p:clrMapOvr>
+    <a:masterClrMapping/>
+  </p:clrMapOvr>
+</p:notes>
+</file>
+
+<file path=ppt/notesSlides/notesSlide7.xml><?xml version="1.0" encoding="utf-8"?>
+<p:notes xmlns:a="http://schemas.openxmlformats.org/drawingml/2006/main" xmlns:r="http://schemas.openxmlformats.org/officeDocument/2006/relationships" xmlns:p="http://schemas.openxmlformats.org/presentationml/2006/main">
+  <p:cSld>
+    <p:spTree>
+      <p:nvGrpSpPr>
+        <p:cNvPr id="1" name=""/>
+        <p:cNvGrpSpPr/>
+        <p:nvPr/>
+      </p:nvGrpSpPr>
+      <p:grpSpPr>
+        <a:xfrm>
+          <a:off x="0" y="0"/>
+          <a:ext cx="0" cy="0"/>
+          <a:chOff x="0" y="0"/>
+          <a:chExt cx="0" cy="0"/>
+        </a:xfrm>
+      </p:grpSpPr>
+      <p:sp>
+        <p:nvSpPr>
+          <p:cNvPr id="2" name="Slide Image Placeholder 1"/>
+          <p:cNvSpPr>
+            <a:spLocks noGrp="1" noRot="1" noChangeAspect="1"/>
+          </p:cNvSpPr>
+          <p:nvPr>
+            <p:ph type="sldImg"/>
+          </p:nvPr>
+        </p:nvSpPr>
+        <p:spPr/>
+      </p:sp>
+      <p:sp>
+        <p:nvSpPr>
+          <p:cNvPr id="3" name="Notes Placeholder 2"/>
+          <p:cNvSpPr>
+            <a:spLocks noGrp="1"/>
+          </p:cNvSpPr>
+          <p:nvPr>
+            <p:ph type="body" idx="1"/>
+          </p:nvPr>
+        </p:nvSpPr>
+        <p:spPr/>
+        <p:txBody>
+          <a:bodyPr/>
+          <a:lstStyle/>
+          <a:p>
+            <a:pPr marL="0" marR="0" indent="0" algn="l" defTabSz="914400" rtl="0" eaLnBrk="1" fontAlgn="auto" latinLnBrk="0" hangingPunct="1">
+              <a:lnSpc>
+                <a:spcPct val="100000"/>
+              </a:lnSpc>
+              <a:spcBef>
+                <a:spcPts val="0"/>
+              </a:spcBef>
+              <a:spcAft>
+                <a:spcPts val="0"/>
+              </a:spcAft>
+              <a:buClrTx/>
+              <a:buSzTx/>
+              <a:buFontTx/>
+              <a:buNone/>
+              <a:tabLst/>
+              <a:defRPr/>
+            </a:pPr>
+            <a:r>
+              <a:rPr lang="vi-VN" sz="1200" b="0" i="0" u="none" strike="noStrike" kern="1200" dirty="0" smtClean="0">
+                <a:solidFill>
+                  <a:schemeClr val="tx1"/>
+                </a:solidFill>
+                <a:effectLst/>
+                <a:latin typeface="+mn-lt"/>
+                <a:ea typeface="+mn-ea"/>
+                <a:cs typeface="+mn-cs"/>
+              </a:rPr>
+              <a:t>Purchase’ ban đầu vì nó sẽ xóa hoàn toàn giao dịch mua như thể nó chưa từng xảy ra. </a:t>
+            </a:r>
+          </a:p>
+          <a:p>
+            <a:endParaRPr lang="en-US" dirty="0"/>
+          </a:p>
+        </p:txBody>
+      </p:sp>
+      <p:sp>
+        <p:nvSpPr>
+          <p:cNvPr id="4" name="Slide Number Placeholder 3"/>
+          <p:cNvSpPr>
+            <a:spLocks noGrp="1"/>
+          </p:cNvSpPr>
+          <p:nvPr>
+            <p:ph type="sldNum" sz="quarter" idx="10"/>
+          </p:nvPr>
+        </p:nvSpPr>
+        <p:spPr/>
+        <p:txBody>
+          <a:bodyPr/>
+          <a:lstStyle/>
+          <a:p>
+            <a:fld id="{ED1DD8EE-9F9D-40C1-B36B-2569414F89B1}" type="slidenum">
+              <a:rPr lang="en-US" smtClean="0"/>
+              <a:t>9</a:t>
+            </a:fld>
+            <a:endParaRPr lang="en-US"/>
+          </a:p>
+        </p:txBody>
+      </p:sp>
+    </p:spTree>
+    <p:extLst>
+      <p:ext uri="{BB962C8B-B14F-4D97-AF65-F5344CB8AC3E}">
+        <p14:creationId xmlns:p14="http://schemas.microsoft.com/office/powerpoint/2010/main" val="2912267813"/>
       </p:ext>
     </p:extLst>
   </p:cSld>
@@ -13922,6 +14491,13 @@
   <p:clrMapOvr>
     <a:masterClrMapping/>
   </p:clrMapOvr>
+  <p:timing>
+    <p:tnLst>
+      <p:par>
+        <p:cTn id="1" dur="indefinite" restart="never" nodeType="tmRoot"/>
+      </p:par>
+    </p:tnLst>
+  </p:timing>
 </p:sld>
 </file>
 
@@ -15351,13 +15927,13 @@
           <p:nvPr/>
         </p:nvPicPr>
         <p:blipFill>
-          <a:blip r:embed="rId3">
+          <a:blip r:embed="rId3" cstate="print">
             <a:extLst>
               <a:ext uri="{28A0092B-C50C-407E-A947-70E740481C1C}">
                 <a14:useLocalDpi xmlns:a14="http://schemas.microsoft.com/office/drawing/2010/main" val="0"/>
               </a:ext>
               <a:ext uri="{96DAC541-7B7A-43D3-8B79-37D633B846F1}">
-                <asvg:svgBlip xmlns:asvg="http://schemas.microsoft.com/office/drawing/2016/SVG/main" r:embed="rId4"/>
+                <asvg:svgBlip xmlns:asvg="http://schemas.microsoft.com/office/drawing/2016/SVG/main" xmlns="" r:embed="rId4"/>
               </a:ext>
             </a:extLst>
           </a:blip>
@@ -15492,6 +16068,97 @@
                       </p:childTnLst>
                     </p:cTn>
                   </p:par>
+                  <p:par>
+                    <p:cTn id="10" fill="hold">
+                      <p:stCondLst>
+                        <p:cond delay="indefinite"/>
+                      </p:stCondLst>
+                      <p:childTnLst>
+                        <p:par>
+                          <p:cTn id="11" fill="hold">
+                            <p:stCondLst>
+                              <p:cond delay="0"/>
+                            </p:stCondLst>
+                            <p:childTnLst>
+                              <p:par>
+                                <p:cTn id="12" presetID="2" presetClass="entr" presetSubtype="4" fill="hold" nodeType="clickEffect">
+                                  <p:stCondLst>
+                                    <p:cond delay="0"/>
+                                  </p:stCondLst>
+                                  <p:childTnLst>
+                                    <p:set>
+                                      <p:cBhvr>
+                                        <p:cTn id="13" dur="1" fill="hold">
+                                          <p:stCondLst>
+                                            <p:cond delay="0"/>
+                                          </p:stCondLst>
+                                        </p:cTn>
+                                        <p:tgtEl>
+                                          <p:spTgt spid="6"/>
+                                        </p:tgtEl>
+                                        <p:attrNameLst>
+                                          <p:attrName>style.visibility</p:attrName>
+                                        </p:attrNameLst>
+                                      </p:cBhvr>
+                                      <p:to>
+                                        <p:strVal val="visible"/>
+                                      </p:to>
+                                    </p:set>
+                                    <p:anim calcmode="lin" valueType="num">
+                                      <p:cBhvr additive="base">
+                                        <p:cTn id="14" dur="500" fill="hold"/>
+                                        <p:tgtEl>
+                                          <p:spTgt spid="6"/>
+                                        </p:tgtEl>
+                                        <p:attrNameLst>
+                                          <p:attrName>ppt_x</p:attrName>
+                                        </p:attrNameLst>
+                                      </p:cBhvr>
+                                      <p:tavLst>
+                                        <p:tav tm="0">
+                                          <p:val>
+                                            <p:strVal val="#ppt_x"/>
+                                          </p:val>
+                                        </p:tav>
+                                        <p:tav tm="100000">
+                                          <p:val>
+                                            <p:strVal val="#ppt_x"/>
+                                          </p:val>
+                                        </p:tav>
+                                      </p:tavLst>
+                                    </p:anim>
+                                    <p:anim calcmode="lin" valueType="num">
+                                      <p:cBhvr additive="base">
+                                        <p:cTn id="15" dur="500" fill="hold"/>
+                                        <p:tgtEl>
+                                          <p:spTgt spid="6"/>
+                                        </p:tgtEl>
+                                        <p:attrNameLst>
+                                          <p:attrName>ppt_y</p:attrName>
+                                        </p:attrNameLst>
+                                      </p:cBhvr>
+                                      <p:tavLst>
+                                        <p:tav tm="0">
+                                          <p:val>
+                                            <p:strVal val="1+#ppt_h/2"/>
+                                          </p:val>
+                                        </p:tav>
+                                        <p:tav tm="100000">
+                                          <p:val>
+                                            <p:strVal val="#ppt_y"/>
+                                          </p:val>
+                                        </p:tav>
+                                      </p:tavLst>
+                                    </p:anim>
+                                  </p:childTnLst>
+                                </p:cTn>
+                              </p:par>
+                            </p:childTnLst>
+                          </p:cTn>
+                        </p:par>
+                      </p:childTnLst>
+                    </p:cTn>
+                  </p:par>
                 </p:childTnLst>
               </p:cTn>
               <p:prevCondLst>
@@ -16857,25 +17524,66 @@
           <a:p>
             <a:r>
               <a:rPr lang="en-US" sz="2800" dirty="0"/>
-              <a:t>+ C</a:t>
+              <a:t>+ </a:t>
+            </a:r>
+            <a:r>
+              <a:rPr lang="en-US" sz="2800" dirty="0" smtClean="0"/>
+              <a:t>C</a:t>
+            </a:r>
+            <a:r>
+              <a:rPr lang="vi-VN" sz="2800" dirty="0" smtClean="0"/>
+              <a:t>hứa </a:t>
             </a:r>
             <a:r>
               <a:rPr lang="vi-VN" sz="2800" dirty="0"/>
-              <a:t>hứa rất nhiều thông tin quan trọng và được bảo mật rất tốt</a:t>
+              <a:t>rất nhiều thông tin quan trọng và được bảo mật rất tốt</a:t>
             </a:r>
             <a:endParaRPr lang="en-GB" sz="2800" dirty="0"/>
           </a:p>
         </p:txBody>
       </p:sp>
-      <p:pic>
-        <p:nvPicPr>
-          <p:cNvPr id="6" name="Graphic 5">
+      <p:sp>
+        <p:nvSpPr>
+          <p:cNvPr id="13" name="TextBox 12">
             <a:extLst>
               <a:ext uri="{FF2B5EF4-FFF2-40B4-BE49-F238E27FC236}">
-                <a16:creationId xmlns:a16="http://schemas.microsoft.com/office/drawing/2014/main" id="{E4F4AB1C-8971-45CE-9BDE-BB4CBFF16B4D}"/>
+                <a16:creationId xmlns:a16="http://schemas.microsoft.com/office/drawing/2014/main" id="{BCEE6339-897E-441D-834F-E72718E39032}"/>
               </a:ext>
             </a:extLst>
           </p:cNvPr>
+          <p:cNvSpPr txBox="1"/>
+          <p:nvPr/>
+        </p:nvSpPr>
+        <p:spPr>
+          <a:xfrm>
+            <a:off x="883420" y="2983899"/>
+            <a:ext cx="11308580" cy="523220"/>
+          </a:xfrm>
+          <a:prstGeom prst="rect">
+            <a:avLst/>
+          </a:prstGeom>
+          <a:noFill/>
+        </p:spPr>
+        <p:txBody>
+          <a:bodyPr wrap="square" rtlCol="0">
+            <a:spAutoFit/>
+          </a:bodyPr>
+          <a:lstStyle/>
+          <a:p>
+            <a:r>
+              <a:rPr lang="en-US" sz="2800" dirty="0"/>
+              <a:t>+ </a:t>
+            </a:r>
+            <a:r>
+              <a:rPr lang="vi-VN" sz="2800" dirty="0"/>
+              <a:t>Có thể được đọc một cách nhanh chóng ở nhiều góc độ khác nhau</a:t>
+            </a:r>
+          </a:p>
+        </p:txBody>
+      </p:sp>
+      <p:pic>
+        <p:nvPicPr>
+          <p:cNvPr id="2" name="Picture 1"/>
           <p:cNvPicPr>
             <a:picLocks noChangeAspect="1"/>
           </p:cNvPicPr>
@@ -16887,9 +17595,6 @@
               <a:ext uri="{28A0092B-C50C-407E-A947-70E740481C1C}">
                 <a14:useLocalDpi xmlns:a14="http://schemas.microsoft.com/office/drawing/2010/main" val="0"/>
               </a:ext>
-              <a:ext uri="{96DAC541-7B7A-43D3-8B79-37D633B846F1}">
-                <asvg:svgBlip xmlns:asvg="http://schemas.microsoft.com/office/drawing/2016/SVG/main" r:embed="rId4"/>
-              </a:ext>
             </a:extLst>
           </a:blip>
           <a:stretch>
@@ -16898,8 +17603,8 @@
         </p:blipFill>
         <p:spPr>
           <a:xfrm>
-            <a:off x="10558608" y="5224608"/>
-            <a:ext cx="1633392" cy="1633392"/>
+            <a:off x="3298324" y="1532771"/>
+            <a:ext cx="5046377" cy="5046377"/>
           </a:xfrm>
           <a:prstGeom prst="rect">
             <a:avLst/>
@@ -16908,192 +17613,157 @@
       </p:pic>
       <p:sp>
         <p:nvSpPr>
-          <p:cNvPr id="13" name="TextBox 12">
-            <a:extLst>
-              <a:ext uri="{FF2B5EF4-FFF2-40B4-BE49-F238E27FC236}">
-                <a16:creationId xmlns:a16="http://schemas.microsoft.com/office/drawing/2014/main" id="{BCEE6339-897E-441D-834F-E72718E39032}"/>
-              </a:ext>
-            </a:extLst>
-          </p:cNvPr>
-          <p:cNvSpPr txBox="1"/>
+          <p:cNvPr id="4" name="Rectangle 3"/>
+          <p:cNvSpPr/>
           <p:nvPr/>
         </p:nvSpPr>
         <p:spPr>
           <a:xfrm>
-            <a:off x="883420" y="2983899"/>
-            <a:ext cx="11308580" cy="523220"/>
+            <a:off x="5600169" y="2610601"/>
+            <a:ext cx="564411" cy="550936"/>
           </a:xfrm>
           <a:prstGeom prst="rect">
             <a:avLst/>
           </a:prstGeom>
           <a:noFill/>
+          <a:ln>
+            <a:solidFill>
+              <a:srgbClr val="FF0000"/>
+            </a:solidFill>
+          </a:ln>
+          <a:effectLst>
+            <a:glow rad="101600">
+              <a:schemeClr val="accent2">
+                <a:satMod val="175000"/>
+                <a:alpha val="40000"/>
+              </a:schemeClr>
+            </a:glow>
+          </a:effectLst>
         </p:spPr>
-        <p:txBody>
-          <a:bodyPr wrap="square" rtlCol="0">
-            <a:spAutoFit/>
-          </a:bodyPr>
+        <p:style>
+          <a:lnRef idx="2">
+            <a:schemeClr val="accent6"/>
+          </a:lnRef>
+          <a:fillRef idx="1">
+            <a:schemeClr val="lt1"/>
+          </a:fillRef>
+          <a:effectRef idx="0">
+            <a:schemeClr val="accent6"/>
+          </a:effectRef>
+          <a:fontRef idx="minor">
+            <a:schemeClr val="dk1"/>
+          </a:fontRef>
+        </p:style>
+        <p:txBody>
+          <a:bodyPr rtlCol="0" anchor="ctr"/>
           <a:lstStyle/>
           <a:p>
-            <a:r>
-              <a:rPr lang="en-US" sz="2800" dirty="0"/>
-              <a:t>+ </a:t>
-            </a:r>
-            <a:r>
-              <a:rPr lang="vi-VN" sz="2800" dirty="0"/>
-              <a:t>Có thể được đọc một cách nhanh chóng ở nhiều góc độ khác nhau</a:t>
-            </a:r>
-          </a:p>
-        </p:txBody>
-      </p:sp>
-      <p:sp>
-        <p:nvSpPr>
-          <p:cNvPr id="14" name="TextBox 13">
-            <a:extLst>
-              <a:ext uri="{FF2B5EF4-FFF2-40B4-BE49-F238E27FC236}">
-                <a16:creationId xmlns:a16="http://schemas.microsoft.com/office/drawing/2014/main" id="{341A6B67-C002-4904-99A6-0E34103447D9}"/>
-              </a:ext>
-            </a:extLst>
-          </p:cNvPr>
-          <p:cNvSpPr txBox="1"/>
+            <a:pPr algn="ctr"/>
+            <a:endParaRPr lang="en-US"/>
+          </a:p>
+        </p:txBody>
+      </p:sp>
+      <p:sp>
+        <p:nvSpPr>
+          <p:cNvPr id="19" name="Rectangle 18"/>
+          <p:cNvSpPr/>
           <p:nvPr/>
         </p:nvSpPr>
         <p:spPr>
           <a:xfrm>
-            <a:off x="883420" y="3749731"/>
-            <a:ext cx="11308580" cy="954107"/>
+            <a:off x="6408024" y="2627375"/>
+            <a:ext cx="564411" cy="550936"/>
           </a:xfrm>
           <a:prstGeom prst="rect">
             <a:avLst/>
           </a:prstGeom>
           <a:noFill/>
+          <a:ln>
+            <a:solidFill>
+              <a:srgbClr val="FF0000"/>
+            </a:solidFill>
+          </a:ln>
+          <a:effectLst>
+            <a:glow rad="101600">
+              <a:schemeClr val="accent2">
+                <a:satMod val="175000"/>
+                <a:alpha val="40000"/>
+              </a:schemeClr>
+            </a:glow>
+          </a:effectLst>
         </p:spPr>
-        <p:txBody>
-          <a:bodyPr wrap="square" rtlCol="0">
-            <a:spAutoFit/>
-          </a:bodyPr>
+        <p:style>
+          <a:lnRef idx="2">
+            <a:schemeClr val="accent6"/>
+          </a:lnRef>
+          <a:fillRef idx="1">
+            <a:schemeClr val="lt1"/>
+          </a:fillRef>
+          <a:effectRef idx="0">
+            <a:schemeClr val="accent6"/>
+          </a:effectRef>
+          <a:fontRef idx="minor">
+            <a:schemeClr val="dk1"/>
+          </a:fontRef>
+        </p:style>
+        <p:txBody>
+          <a:bodyPr rtlCol="0" anchor="ctr"/>
           <a:lstStyle/>
           <a:p>
-            <a:r>
-              <a:rPr lang="en-US" sz="2800" dirty="0"/>
-              <a:t>+ </a:t>
-            </a:r>
-            <a:r>
-              <a:rPr lang="en-US" sz="2800" dirty="0" err="1"/>
-              <a:t>Ngay</a:t>
-            </a:r>
-            <a:r>
-              <a:rPr lang="en-US" sz="2800" dirty="0"/>
-              <a:t> </a:t>
-            </a:r>
-            <a:r>
-              <a:rPr lang="en-US" sz="2800" dirty="0" err="1"/>
-              <a:t>cả</a:t>
-            </a:r>
-            <a:r>
-              <a:rPr lang="en-US" sz="2800" dirty="0"/>
-              <a:t> </a:t>
-            </a:r>
-            <a:r>
-              <a:rPr lang="en-US" sz="2800" dirty="0" err="1"/>
-              <a:t>khi</a:t>
-            </a:r>
-            <a:r>
-              <a:rPr lang="en-US" sz="2800" dirty="0"/>
-              <a:t> QR code </a:t>
-            </a:r>
-            <a:r>
-              <a:rPr lang="en-US" sz="2800" dirty="0" err="1"/>
-              <a:t>bị</a:t>
-            </a:r>
-            <a:r>
-              <a:rPr lang="en-US" sz="2800" dirty="0"/>
-              <a:t> </a:t>
-            </a:r>
-            <a:r>
-              <a:rPr lang="en-US" sz="2800" dirty="0" err="1"/>
-              <a:t>bẩn</a:t>
-            </a:r>
-            <a:r>
-              <a:rPr lang="en-US" sz="2800" dirty="0"/>
-              <a:t> hay </a:t>
-            </a:r>
-            <a:r>
-              <a:rPr lang="en-US" sz="2800" dirty="0" err="1"/>
-              <a:t>hỏng</a:t>
-            </a:r>
-            <a:r>
-              <a:rPr lang="en-US" sz="2800" dirty="0"/>
-              <a:t>, ta </a:t>
-            </a:r>
-            <a:r>
-              <a:rPr lang="en-US" sz="2800" dirty="0" err="1"/>
-              <a:t>vẫn</a:t>
-            </a:r>
-            <a:r>
-              <a:rPr lang="en-US" sz="2800" dirty="0"/>
-              <a:t> </a:t>
-            </a:r>
-            <a:r>
-              <a:rPr lang="en-US" sz="2800" dirty="0" err="1"/>
-              <a:t>có</a:t>
-            </a:r>
-            <a:r>
-              <a:rPr lang="en-US" sz="2800" dirty="0"/>
-              <a:t> </a:t>
-            </a:r>
-            <a:r>
-              <a:rPr lang="en-US" sz="2800" dirty="0" err="1"/>
-              <a:t>thể</a:t>
-            </a:r>
-            <a:r>
-              <a:rPr lang="en-US" sz="2800" dirty="0"/>
-              <a:t> </a:t>
-            </a:r>
-            <a:r>
-              <a:rPr lang="en-US" sz="2800" dirty="0" err="1"/>
-              <a:t>khôi</a:t>
-            </a:r>
-            <a:r>
-              <a:rPr lang="en-US" sz="2800" dirty="0"/>
-              <a:t> </a:t>
-            </a:r>
-            <a:r>
-              <a:rPr lang="en-US" sz="2800" dirty="0" err="1"/>
-              <a:t>phục</a:t>
-            </a:r>
-            <a:r>
-              <a:rPr lang="en-US" sz="2800" dirty="0"/>
-              <a:t> </a:t>
-            </a:r>
-            <a:r>
-              <a:rPr lang="en-US" sz="2800" dirty="0" err="1"/>
-              <a:t>thông</a:t>
-            </a:r>
-            <a:r>
-              <a:rPr lang="en-US" sz="2800" dirty="0"/>
-              <a:t> tin </a:t>
-            </a:r>
-            <a:r>
-              <a:rPr lang="en-US" sz="2800" dirty="0" err="1"/>
-              <a:t>chứa</a:t>
-            </a:r>
-            <a:r>
-              <a:rPr lang="en-US" sz="2800" dirty="0"/>
-              <a:t> </a:t>
-            </a:r>
-            <a:r>
-              <a:rPr lang="en-US" sz="2800" dirty="0" err="1"/>
-              <a:t>trong</a:t>
-            </a:r>
-            <a:r>
-              <a:rPr lang="en-US" sz="2800" dirty="0"/>
-              <a:t> </a:t>
-            </a:r>
-            <a:r>
-              <a:rPr lang="en-US" sz="2800" dirty="0" err="1"/>
-              <a:t>nó</a:t>
-            </a:r>
-            <a:endParaRPr lang="en-US" sz="2800" dirty="0"/>
+            <a:pPr algn="ctr"/>
+            <a:endParaRPr lang="en-US"/>
+          </a:p>
+        </p:txBody>
+      </p:sp>
+      <p:sp>
+        <p:nvSpPr>
+          <p:cNvPr id="20" name="Rectangle 19"/>
+          <p:cNvSpPr/>
+          <p:nvPr/>
+        </p:nvSpPr>
+        <p:spPr>
+          <a:xfrm>
+            <a:off x="5600168" y="3474263"/>
+            <a:ext cx="564411" cy="550936"/>
+          </a:xfrm>
+          <a:prstGeom prst="rect">
+            <a:avLst/>
+          </a:prstGeom>
+          <a:noFill/>
+          <a:ln>
+            <a:solidFill>
+              <a:srgbClr val="FF0000"/>
+            </a:solidFill>
+          </a:ln>
+          <a:effectLst>
+            <a:glow rad="101600">
+              <a:schemeClr val="accent2">
+                <a:satMod val="175000"/>
+                <a:alpha val="40000"/>
+              </a:schemeClr>
+            </a:glow>
+          </a:effectLst>
+        </p:spPr>
+        <p:style>
+          <a:lnRef idx="2">
+            <a:schemeClr val="accent6"/>
+          </a:lnRef>
+          <a:fillRef idx="1">
+            <a:schemeClr val="lt1"/>
+          </a:fillRef>
+          <a:effectRef idx="0">
+            <a:schemeClr val="accent6"/>
+          </a:effectRef>
+          <a:fontRef idx="minor">
+            <a:schemeClr val="dk1"/>
+          </a:fontRef>
+        </p:style>
+        <p:txBody>
+          <a:bodyPr rtlCol="0" anchor="ctr"/>
+          <a:lstStyle/>
+          <a:p>
+            <a:pPr algn="ctr"/>
+            <a:endParaRPr lang="en-US"/>
           </a:p>
         </p:txBody>
       </p:sp>
@@ -17326,7 +17996,7 @@
                             </p:stCondLst>
                             <p:childTnLst>
                               <p:par>
-                                <p:cTn id="19" presetID="42" presetClass="entr" presetSubtype="0" fill="hold" grpId="0" nodeType="clickEffect">
+                                <p:cTn id="19" presetID="2" presetClass="entr" presetSubtype="4" fill="hold" nodeType="clickEffect">
                                   <p:stCondLst>
                                     <p:cond delay="0"/>
                                   </p:stCondLst>
@@ -17334,6 +18004,1817 @@
                                     <p:set>
                                       <p:cBhvr>
                                         <p:cTn id="20" dur="1" fill="hold">
+                                          <p:stCondLst>
+                                            <p:cond delay="0"/>
+                                          </p:stCondLst>
+                                        </p:cTn>
+                                        <p:tgtEl>
+                                          <p:spTgt spid="2"/>
+                                        </p:tgtEl>
+                                        <p:attrNameLst>
+                                          <p:attrName>style.visibility</p:attrName>
+                                        </p:attrNameLst>
+                                      </p:cBhvr>
+                                      <p:to>
+                                        <p:strVal val="visible"/>
+                                      </p:to>
+                                    </p:set>
+                                    <p:anim calcmode="lin" valueType="num">
+                                      <p:cBhvr additive="base">
+                                        <p:cTn id="21" dur="500" fill="hold"/>
+                                        <p:tgtEl>
+                                          <p:spTgt spid="2"/>
+                                        </p:tgtEl>
+                                        <p:attrNameLst>
+                                          <p:attrName>ppt_x</p:attrName>
+                                        </p:attrNameLst>
+                                      </p:cBhvr>
+                                      <p:tavLst>
+                                        <p:tav tm="0">
+                                          <p:val>
+                                            <p:strVal val="#ppt_x"/>
+                                          </p:val>
+                                        </p:tav>
+                                        <p:tav tm="100000">
+                                          <p:val>
+                                            <p:strVal val="#ppt_x"/>
+                                          </p:val>
+                                        </p:tav>
+                                      </p:tavLst>
+                                    </p:anim>
+                                    <p:anim calcmode="lin" valueType="num">
+                                      <p:cBhvr additive="base">
+                                        <p:cTn id="22" dur="500" fill="hold"/>
+                                        <p:tgtEl>
+                                          <p:spTgt spid="2"/>
+                                        </p:tgtEl>
+                                        <p:attrNameLst>
+                                          <p:attrName>ppt_y</p:attrName>
+                                        </p:attrNameLst>
+                                      </p:cBhvr>
+                                      <p:tavLst>
+                                        <p:tav tm="0">
+                                          <p:val>
+                                            <p:strVal val="1+#ppt_h/2"/>
+                                          </p:val>
+                                        </p:tav>
+                                        <p:tav tm="100000">
+                                          <p:val>
+                                            <p:strVal val="#ppt_y"/>
+                                          </p:val>
+                                        </p:tav>
+                                      </p:tavLst>
+                                    </p:anim>
+                                  </p:childTnLst>
+                                </p:cTn>
+                              </p:par>
+                            </p:childTnLst>
+                          </p:cTn>
+                        </p:par>
+                      </p:childTnLst>
+                    </p:cTn>
+                  </p:par>
+                  <p:par>
+                    <p:cTn id="23" fill="hold">
+                      <p:stCondLst>
+                        <p:cond delay="indefinite"/>
+                      </p:stCondLst>
+                      <p:childTnLst>
+                        <p:par>
+                          <p:cTn id="24" fill="hold">
+                            <p:stCondLst>
+                              <p:cond delay="0"/>
+                            </p:stCondLst>
+                            <p:childTnLst>
+                              <p:par>
+                                <p:cTn id="25" presetID="10" presetClass="entr" presetSubtype="0" fill="hold" grpId="0" nodeType="clickEffect">
+                                  <p:stCondLst>
+                                    <p:cond delay="0"/>
+                                  </p:stCondLst>
+                                  <p:childTnLst>
+                                    <p:set>
+                                      <p:cBhvr>
+                                        <p:cTn id="26" dur="1" fill="hold">
+                                          <p:stCondLst>
+                                            <p:cond delay="0"/>
+                                          </p:stCondLst>
+                                        </p:cTn>
+                                        <p:tgtEl>
+                                          <p:spTgt spid="20"/>
+                                        </p:tgtEl>
+                                        <p:attrNameLst>
+                                          <p:attrName>style.visibility</p:attrName>
+                                        </p:attrNameLst>
+                                      </p:cBhvr>
+                                      <p:to>
+                                        <p:strVal val="visible"/>
+                                      </p:to>
+                                    </p:set>
+                                    <p:animEffect transition="in" filter="fade">
+                                      <p:cBhvr>
+                                        <p:cTn id="27" dur="500"/>
+                                        <p:tgtEl>
+                                          <p:spTgt spid="20"/>
+                                        </p:tgtEl>
+                                      </p:cBhvr>
+                                    </p:animEffect>
+                                  </p:childTnLst>
+                                </p:cTn>
+                              </p:par>
+                              <p:par>
+                                <p:cTn id="28" presetID="10" presetClass="entr" presetSubtype="0" fill="hold" grpId="0" nodeType="withEffect">
+                                  <p:stCondLst>
+                                    <p:cond delay="0"/>
+                                  </p:stCondLst>
+                                  <p:childTnLst>
+                                    <p:set>
+                                      <p:cBhvr>
+                                        <p:cTn id="29" dur="1" fill="hold">
+                                          <p:stCondLst>
+                                            <p:cond delay="0"/>
+                                          </p:stCondLst>
+                                        </p:cTn>
+                                        <p:tgtEl>
+                                          <p:spTgt spid="4"/>
+                                        </p:tgtEl>
+                                        <p:attrNameLst>
+                                          <p:attrName>style.visibility</p:attrName>
+                                        </p:attrNameLst>
+                                      </p:cBhvr>
+                                      <p:to>
+                                        <p:strVal val="visible"/>
+                                      </p:to>
+                                    </p:set>
+                                    <p:animEffect transition="in" filter="fade">
+                                      <p:cBhvr>
+                                        <p:cTn id="30" dur="500"/>
+                                        <p:tgtEl>
+                                          <p:spTgt spid="4"/>
+                                        </p:tgtEl>
+                                      </p:cBhvr>
+                                    </p:animEffect>
+                                  </p:childTnLst>
+                                </p:cTn>
+                              </p:par>
+                              <p:par>
+                                <p:cTn id="31" presetID="10" presetClass="entr" presetSubtype="0" fill="hold" grpId="0" nodeType="withEffect">
+                                  <p:stCondLst>
+                                    <p:cond delay="0"/>
+                                  </p:stCondLst>
+                                  <p:childTnLst>
+                                    <p:set>
+                                      <p:cBhvr>
+                                        <p:cTn id="32" dur="1" fill="hold">
+                                          <p:stCondLst>
+                                            <p:cond delay="0"/>
+                                          </p:stCondLst>
+                                        </p:cTn>
+                                        <p:tgtEl>
+                                          <p:spTgt spid="19"/>
+                                        </p:tgtEl>
+                                        <p:attrNameLst>
+                                          <p:attrName>style.visibility</p:attrName>
+                                        </p:attrNameLst>
+                                      </p:cBhvr>
+                                      <p:to>
+                                        <p:strVal val="visible"/>
+                                      </p:to>
+                                    </p:set>
+                                    <p:animEffect transition="in" filter="fade">
+                                      <p:cBhvr>
+                                        <p:cTn id="33" dur="500"/>
+                                        <p:tgtEl>
+                                          <p:spTgt spid="19"/>
+                                        </p:tgtEl>
+                                      </p:cBhvr>
+                                    </p:animEffect>
+                                  </p:childTnLst>
+                                </p:cTn>
+                              </p:par>
+                            </p:childTnLst>
+                          </p:cTn>
+                        </p:par>
+                      </p:childTnLst>
+                    </p:cTn>
+                  </p:par>
+                </p:childTnLst>
+              </p:cTn>
+              <p:prevCondLst>
+                <p:cond evt="onPrev" delay="0">
+                  <p:tgtEl>
+                    <p:sldTgt/>
+                  </p:tgtEl>
+                </p:cond>
+              </p:prevCondLst>
+              <p:nextCondLst>
+                <p:cond evt="onNext" delay="0">
+                  <p:tgtEl>
+                    <p:sldTgt/>
+                  </p:tgtEl>
+                </p:cond>
+              </p:nextCondLst>
+            </p:seq>
+          </p:childTnLst>
+        </p:cTn>
+      </p:par>
+    </p:tnLst>
+    <p:bldLst>
+      <p:bldP spid="53" grpId="0"/>
+      <p:bldP spid="13" grpId="0"/>
+      <p:bldP spid="4" grpId="0" animBg="1"/>
+      <p:bldP spid="19" grpId="0" animBg="1"/>
+      <p:bldP spid="20" grpId="0" animBg="1"/>
+    </p:bldLst>
+  </p:timing>
+</p:sld>
+</file>
+
+<file path=ppt/slides/slide4.xml><?xml version="1.0" encoding="utf-8"?>
+<p:sld xmlns:a="http://schemas.openxmlformats.org/drawingml/2006/main" xmlns:r="http://schemas.openxmlformats.org/officeDocument/2006/relationships" xmlns:p="http://schemas.openxmlformats.org/presentationml/2006/main">
+  <p:cSld>
+    <p:spTree>
+      <p:nvGrpSpPr>
+        <p:cNvPr id="1" name=""/>
+        <p:cNvGrpSpPr/>
+        <p:nvPr/>
+      </p:nvGrpSpPr>
+      <p:grpSpPr>
+        <a:xfrm>
+          <a:off x="0" y="0"/>
+          <a:ext cx="0" cy="0"/>
+          <a:chOff x="0" y="0"/>
+          <a:chExt cx="0" cy="0"/>
+        </a:xfrm>
+      </p:grpSpPr>
+      <p:sp>
+        <p:nvSpPr>
+          <p:cNvPr id="5" name="Title 1">
+            <a:extLst>
+              <a:ext uri="{FF2B5EF4-FFF2-40B4-BE49-F238E27FC236}">
+                <a16:creationId xmlns:a16="http://schemas.microsoft.com/office/drawing/2014/main" id="{C20C253D-C7DD-7144-B794-69287D36BF83}"/>
+              </a:ext>
+            </a:extLst>
+          </p:cNvPr>
+          <p:cNvSpPr txBox="1">
+            <a:spLocks/>
+          </p:cNvSpPr>
+          <p:nvPr/>
+        </p:nvSpPr>
+        <p:spPr>
+          <a:xfrm>
+            <a:off x="-146303" y="-36576"/>
+            <a:ext cx="3499103" cy="1138238"/>
+          </a:xfrm>
+          <a:prstGeom prst="rect">
+            <a:avLst/>
+          </a:prstGeom>
+        </p:spPr>
+        <p:txBody>
+          <a:bodyPr vert="horz" lIns="91440" tIns="45720" rIns="91440" bIns="45720" rtlCol="0" anchor="ctr">
+            <a:normAutofit fontScale="97500"/>
+          </a:bodyPr>
+          <a:lstStyle>
+            <a:lvl1pPr algn="l" defTabSz="914400" rtl="0" eaLnBrk="1" latinLnBrk="0" hangingPunct="1">
+              <a:lnSpc>
+                <a:spcPct val="90000"/>
+              </a:lnSpc>
+              <a:spcBef>
+                <a:spcPct val="0"/>
+              </a:spcBef>
+              <a:buNone/>
+              <a:defRPr sz="4400" kern="1200">
+                <a:solidFill>
+                  <a:schemeClr val="tx1"/>
+                </a:solidFill>
+                <a:latin typeface="+mj-lt"/>
+                <a:ea typeface="+mj-ea"/>
+                <a:cs typeface="+mj-cs"/>
+              </a:defRPr>
+            </a:lvl1pPr>
+          </a:lstStyle>
+          <a:p>
+            <a:pPr algn="ctr"/>
+            <a:r>
+              <a:rPr lang="en-AU" sz="3200" b="1" dirty="0">
+                <a:solidFill>
+                  <a:schemeClr val="bg1"/>
+                </a:solidFill>
+                <a:latin typeface="Arial" pitchFamily="34" charset="0"/>
+                <a:ea typeface="Tahoma" panose="020B0604030504040204" pitchFamily="34" charset="0"/>
+                <a:cs typeface="Arial" pitchFamily="34" charset="0"/>
+              </a:rPr>
+              <a:t>QRCODE</a:t>
+            </a:r>
+          </a:p>
+        </p:txBody>
+      </p:sp>
+      <p:grpSp>
+        <p:nvGrpSpPr>
+          <p:cNvPr id="45" name="Group 44">
+            <a:extLst>
+              <a:ext uri="{FF2B5EF4-FFF2-40B4-BE49-F238E27FC236}">
+                <a16:creationId xmlns:a16="http://schemas.microsoft.com/office/drawing/2014/main" id="{C0092D73-82F8-45EB-A274-DE2C8D08FB68}"/>
+              </a:ext>
+            </a:extLst>
+          </p:cNvPr>
+          <p:cNvGrpSpPr/>
+          <p:nvPr/>
+        </p:nvGrpSpPr>
+        <p:grpSpPr>
+          <a:xfrm>
+            <a:off x="523742" y="1509022"/>
+            <a:ext cx="9694315" cy="523220"/>
+            <a:chOff x="527012" y="1117369"/>
+            <a:chExt cx="9694315" cy="523220"/>
+          </a:xfrm>
+        </p:grpSpPr>
+        <p:sp>
+          <p:nvSpPr>
+            <p:cNvPr id="46" name="TextBox 45">
+              <a:extLst>
+                <a:ext uri="{FF2B5EF4-FFF2-40B4-BE49-F238E27FC236}">
+                  <a16:creationId xmlns:a16="http://schemas.microsoft.com/office/drawing/2014/main" id="{8012E19A-CBFE-4B7C-8AF8-CC161C9DF2B3}"/>
+                </a:ext>
+              </a:extLst>
+            </p:cNvPr>
+            <p:cNvSpPr txBox="1"/>
+            <p:nvPr/>
+          </p:nvSpPr>
+          <p:spPr>
+            <a:xfrm>
+              <a:off x="886691" y="1117369"/>
+              <a:ext cx="9334636" cy="523220"/>
+            </a:xfrm>
+            <a:prstGeom prst="rect">
+              <a:avLst/>
+            </a:prstGeom>
+            <a:noFill/>
+          </p:spPr>
+          <p:txBody>
+            <a:bodyPr wrap="square" rtlCol="0">
+              <a:spAutoFit/>
+            </a:bodyPr>
+            <a:lstStyle/>
+            <a:p>
+              <a:r>
+                <a:rPr lang="en-GB" sz="2800" b="1" dirty="0" err="1"/>
+                <a:t>Đặc</a:t>
+              </a:r>
+              <a:r>
+                <a:rPr lang="en-GB" sz="2800" b="1" dirty="0"/>
+                <a:t> </a:t>
+              </a:r>
+              <a:r>
+                <a:rPr lang="en-GB" sz="2800" b="1" dirty="0" err="1"/>
+                <a:t>điểm</a:t>
+              </a:r>
+              <a:r>
+                <a:rPr lang="en-GB" sz="2800" b="1" dirty="0"/>
+                <a:t> </a:t>
+              </a:r>
+              <a:r>
+                <a:rPr lang="en-GB" sz="2800" b="1" dirty="0" err="1"/>
+                <a:t>của</a:t>
+              </a:r>
+              <a:r>
+                <a:rPr lang="en-GB" sz="2800" b="1" dirty="0"/>
+                <a:t> </a:t>
+              </a:r>
+              <a:r>
+                <a:rPr lang="en-GB" sz="2800" b="1" dirty="0" err="1"/>
+                <a:t>mã</a:t>
+              </a:r>
+              <a:r>
+                <a:rPr lang="en-GB" sz="2800" b="1" dirty="0"/>
+                <a:t> QR</a:t>
+              </a:r>
+            </a:p>
+          </p:txBody>
+        </p:sp>
+        <p:grpSp>
+          <p:nvGrpSpPr>
+            <p:cNvPr id="47" name="Google Shape;11276;p61">
+              <a:extLst>
+                <a:ext uri="{FF2B5EF4-FFF2-40B4-BE49-F238E27FC236}">
+                  <a16:creationId xmlns:a16="http://schemas.microsoft.com/office/drawing/2014/main" id="{D157D4E8-E3CE-427A-97F8-A6F43C7200BA}"/>
+                </a:ext>
+              </a:extLst>
+            </p:cNvPr>
+            <p:cNvGrpSpPr/>
+            <p:nvPr/>
+          </p:nvGrpSpPr>
+          <p:grpSpPr>
+            <a:xfrm>
+              <a:off x="527012" y="1141118"/>
+              <a:ext cx="359679" cy="321833"/>
+              <a:chOff x="4670239" y="1541599"/>
+              <a:chExt cx="359679" cy="321833"/>
+            </a:xfrm>
+          </p:grpSpPr>
+          <p:sp>
+            <p:nvSpPr>
+              <p:cNvPr id="48" name="Google Shape;11277;p61">
+                <a:extLst>
+                  <a:ext uri="{FF2B5EF4-FFF2-40B4-BE49-F238E27FC236}">
+                    <a16:creationId xmlns:a16="http://schemas.microsoft.com/office/drawing/2014/main" id="{B250068A-1A35-42F2-8065-D8EB15E25FFE}"/>
+                  </a:ext>
+                </a:extLst>
+              </p:cNvPr>
+              <p:cNvSpPr/>
+              <p:nvPr/>
+            </p:nvSpPr>
+            <p:spPr>
+              <a:xfrm>
+                <a:off x="4818790" y="1606787"/>
+                <a:ext cx="28838" cy="49687"/>
+              </a:xfrm>
+              <a:custGeom>
+                <a:avLst/>
+                <a:gdLst/>
+                <a:ahLst/>
+                <a:cxnLst/>
+                <a:rect l="l" t="t" r="r" b="b"/>
+                <a:pathLst>
+                  <a:path w="906" h="1561" extrusionOk="0">
+                    <a:moveTo>
+                      <a:pt x="429" y="298"/>
+                    </a:moveTo>
+                    <a:lnTo>
+                      <a:pt x="429" y="584"/>
+                    </a:lnTo>
+                    <a:cubicBezTo>
+                      <a:pt x="310" y="537"/>
+                      <a:pt x="287" y="489"/>
+                      <a:pt x="287" y="429"/>
+                    </a:cubicBezTo>
+                    <a:cubicBezTo>
+                      <a:pt x="287" y="346"/>
+                      <a:pt x="358" y="310"/>
+                      <a:pt x="429" y="298"/>
+                    </a:cubicBezTo>
+                    <a:close/>
+                    <a:moveTo>
+                      <a:pt x="537" y="882"/>
+                    </a:moveTo>
+                    <a:cubicBezTo>
+                      <a:pt x="656" y="929"/>
+                      <a:pt x="680" y="989"/>
+                      <a:pt x="680" y="1060"/>
+                    </a:cubicBezTo>
+                    <a:cubicBezTo>
+                      <a:pt x="680" y="1132"/>
+                      <a:pt x="620" y="1191"/>
+                      <a:pt x="537" y="1203"/>
+                    </a:cubicBezTo>
+                    <a:lnTo>
+                      <a:pt x="537" y="882"/>
+                    </a:lnTo>
+                    <a:close/>
+                    <a:moveTo>
+                      <a:pt x="477" y="1"/>
+                    </a:moveTo>
+                    <a:cubicBezTo>
+                      <a:pt x="441" y="1"/>
+                      <a:pt x="418" y="13"/>
+                      <a:pt x="418" y="48"/>
+                    </a:cubicBezTo>
+                    <a:lnTo>
+                      <a:pt x="418" y="108"/>
+                    </a:lnTo>
+                    <a:cubicBezTo>
+                      <a:pt x="191" y="132"/>
+                      <a:pt x="48" y="251"/>
+                      <a:pt x="48" y="477"/>
+                    </a:cubicBezTo>
+                    <a:cubicBezTo>
+                      <a:pt x="48" y="715"/>
+                      <a:pt x="227" y="787"/>
+                      <a:pt x="418" y="870"/>
+                    </a:cubicBezTo>
+                    <a:lnTo>
+                      <a:pt x="418" y="1239"/>
+                    </a:lnTo>
+                    <a:cubicBezTo>
+                      <a:pt x="310" y="1215"/>
+                      <a:pt x="263" y="1191"/>
+                      <a:pt x="179" y="1120"/>
+                    </a:cubicBezTo>
+                    <a:cubicBezTo>
+                      <a:pt x="159" y="1104"/>
+                      <a:pt x="138" y="1096"/>
+                      <a:pt x="118" y="1096"/>
+                    </a:cubicBezTo>
+                    <a:cubicBezTo>
+                      <a:pt x="93" y="1096"/>
+                      <a:pt x="69" y="1110"/>
+                      <a:pt x="48" y="1144"/>
+                    </a:cubicBezTo>
+                    <a:cubicBezTo>
+                      <a:pt x="1" y="1203"/>
+                      <a:pt x="1" y="1263"/>
+                      <a:pt x="48" y="1310"/>
+                    </a:cubicBezTo>
+                    <a:cubicBezTo>
+                      <a:pt x="120" y="1418"/>
+                      <a:pt x="287" y="1465"/>
+                      <a:pt x="418" y="1465"/>
+                    </a:cubicBezTo>
+                    <a:lnTo>
+                      <a:pt x="418" y="1513"/>
+                    </a:lnTo>
+                    <a:cubicBezTo>
+                      <a:pt x="418" y="1549"/>
+                      <a:pt x="441" y="1560"/>
+                      <a:pt x="477" y="1560"/>
+                    </a:cubicBezTo>
+                    <a:cubicBezTo>
+                      <a:pt x="501" y="1560"/>
+                      <a:pt x="537" y="1549"/>
+                      <a:pt x="537" y="1513"/>
+                    </a:cubicBezTo>
+                    <a:lnTo>
+                      <a:pt x="537" y="1429"/>
+                    </a:lnTo>
+                    <a:cubicBezTo>
+                      <a:pt x="727" y="1406"/>
+                      <a:pt x="894" y="1263"/>
+                      <a:pt x="894" y="1025"/>
+                    </a:cubicBezTo>
+                    <a:cubicBezTo>
+                      <a:pt x="906" y="787"/>
+                      <a:pt x="763" y="703"/>
+                      <a:pt x="549" y="632"/>
+                    </a:cubicBezTo>
+                    <a:lnTo>
+                      <a:pt x="549" y="286"/>
+                    </a:lnTo>
+                    <a:cubicBezTo>
+                      <a:pt x="596" y="286"/>
+                      <a:pt x="644" y="298"/>
+                      <a:pt x="680" y="334"/>
+                    </a:cubicBezTo>
+                    <a:cubicBezTo>
+                      <a:pt x="707" y="341"/>
+                      <a:pt x="738" y="363"/>
+                      <a:pt x="771" y="363"/>
+                    </a:cubicBezTo>
+                    <a:cubicBezTo>
+                      <a:pt x="795" y="363"/>
+                      <a:pt x="821" y="351"/>
+                      <a:pt x="846" y="310"/>
+                    </a:cubicBezTo>
+                    <a:cubicBezTo>
+                      <a:pt x="882" y="275"/>
+                      <a:pt x="894" y="215"/>
+                      <a:pt x="834" y="167"/>
+                    </a:cubicBezTo>
+                    <a:cubicBezTo>
+                      <a:pt x="763" y="108"/>
+                      <a:pt x="644" y="96"/>
+                      <a:pt x="537" y="96"/>
+                    </a:cubicBezTo>
+                    <a:lnTo>
+                      <a:pt x="537" y="48"/>
+                    </a:lnTo>
+                    <a:cubicBezTo>
+                      <a:pt x="537" y="13"/>
+                      <a:pt x="501" y="1"/>
+                      <a:pt x="477" y="1"/>
+                    </a:cubicBezTo>
+                    <a:close/>
+                  </a:path>
+                </a:pathLst>
+              </a:custGeom>
+              <a:solidFill>
+                <a:srgbClr val="657E93"/>
+              </a:solidFill>
+              <a:ln>
+                <a:solidFill>
+                  <a:schemeClr val="tx2">
+                    <a:lumMod val="75000"/>
+                  </a:schemeClr>
+                </a:solidFill>
+              </a:ln>
+            </p:spPr>
+            <p:txBody>
+              <a:bodyPr spcFirstLastPara="1" wrap="square" lIns="91425" tIns="91425" rIns="91425" bIns="91425" anchor="ctr" anchorCtr="0">
+                <a:noAutofit/>
+              </a:bodyPr>
+              <a:lstStyle/>
+              <a:p>
+                <a:pPr marL="0" lvl="0" indent="0" algn="l" rtl="0">
+                  <a:spcBef>
+                    <a:spcPts val="0"/>
+                  </a:spcBef>
+                  <a:spcAft>
+                    <a:spcPts val="0"/>
+                  </a:spcAft>
+                  <a:buNone/>
+                </a:pPr>
+                <a:endParaRPr/>
+              </a:p>
+            </p:txBody>
+          </p:sp>
+          <p:sp>
+            <p:nvSpPr>
+              <p:cNvPr id="49" name="Google Shape;11278;p61">
+                <a:extLst>
+                  <a:ext uri="{FF2B5EF4-FFF2-40B4-BE49-F238E27FC236}">
+                    <a16:creationId xmlns:a16="http://schemas.microsoft.com/office/drawing/2014/main" id="{CDC10866-FFA4-45AA-9858-02B24445BD5D}"/>
+                  </a:ext>
+                </a:extLst>
+              </p:cNvPr>
+              <p:cNvSpPr/>
+              <p:nvPr/>
+            </p:nvSpPr>
+            <p:spPr>
+              <a:xfrm>
+                <a:off x="4875256" y="1557896"/>
+                <a:ext cx="82281" cy="82663"/>
+              </a:xfrm>
+              <a:custGeom>
+                <a:avLst/>
+                <a:gdLst/>
+                <a:ahLst/>
+                <a:cxnLst/>
+                <a:rect l="l" t="t" r="r" b="b"/>
+                <a:pathLst>
+                  <a:path w="2585" h="2597" extrusionOk="0">
+                    <a:moveTo>
+                      <a:pt x="1287" y="310"/>
+                    </a:moveTo>
+                    <a:cubicBezTo>
+                      <a:pt x="1823" y="310"/>
+                      <a:pt x="2275" y="751"/>
+                      <a:pt x="2275" y="1299"/>
+                    </a:cubicBezTo>
+                    <a:cubicBezTo>
+                      <a:pt x="2263" y="1834"/>
+                      <a:pt x="1823" y="2275"/>
+                      <a:pt x="1287" y="2275"/>
+                    </a:cubicBezTo>
+                    <a:cubicBezTo>
+                      <a:pt x="751" y="2275"/>
+                      <a:pt x="310" y="1846"/>
+                      <a:pt x="310" y="1299"/>
+                    </a:cubicBezTo>
+                    <a:cubicBezTo>
+                      <a:pt x="310" y="763"/>
+                      <a:pt x="739" y="310"/>
+                      <a:pt x="1287" y="310"/>
+                    </a:cubicBezTo>
+                    <a:close/>
+                    <a:moveTo>
+                      <a:pt x="1287" y="1"/>
+                    </a:moveTo>
+                    <a:cubicBezTo>
+                      <a:pt x="572" y="1"/>
+                      <a:pt x="1" y="584"/>
+                      <a:pt x="1" y="1299"/>
+                    </a:cubicBezTo>
+                    <a:cubicBezTo>
+                      <a:pt x="1" y="2013"/>
+                      <a:pt x="572" y="2596"/>
+                      <a:pt x="1287" y="2596"/>
+                    </a:cubicBezTo>
+                    <a:cubicBezTo>
+                      <a:pt x="2001" y="2596"/>
+                      <a:pt x="2585" y="2013"/>
+                      <a:pt x="2585" y="1299"/>
+                    </a:cubicBezTo>
+                    <a:cubicBezTo>
+                      <a:pt x="2585" y="584"/>
+                      <a:pt x="2001" y="1"/>
+                      <a:pt x="1287" y="1"/>
+                    </a:cubicBezTo>
+                    <a:close/>
+                  </a:path>
+                </a:pathLst>
+              </a:custGeom>
+              <a:solidFill>
+                <a:srgbClr val="657E93"/>
+              </a:solidFill>
+              <a:ln>
+                <a:solidFill>
+                  <a:schemeClr val="tx2">
+                    <a:lumMod val="75000"/>
+                  </a:schemeClr>
+                </a:solidFill>
+              </a:ln>
+            </p:spPr>
+            <p:txBody>
+              <a:bodyPr spcFirstLastPara="1" wrap="square" lIns="91425" tIns="91425" rIns="91425" bIns="91425" anchor="ctr" anchorCtr="0">
+                <a:noAutofit/>
+              </a:bodyPr>
+              <a:lstStyle/>
+              <a:p>
+                <a:pPr marL="0" lvl="0" indent="0" algn="l" rtl="0">
+                  <a:spcBef>
+                    <a:spcPts val="0"/>
+                  </a:spcBef>
+                  <a:spcAft>
+                    <a:spcPts val="0"/>
+                  </a:spcAft>
+                  <a:buNone/>
+                </a:pPr>
+                <a:endParaRPr/>
+              </a:p>
+            </p:txBody>
+          </p:sp>
+          <p:sp>
+            <p:nvSpPr>
+              <p:cNvPr id="50" name="Google Shape;11279;p61">
+                <a:extLst>
+                  <a:ext uri="{FF2B5EF4-FFF2-40B4-BE49-F238E27FC236}">
+                    <a16:creationId xmlns:a16="http://schemas.microsoft.com/office/drawing/2014/main" id="{C4F59487-E593-4CA8-87D0-8AF369F6C1CE}"/>
+                  </a:ext>
+                </a:extLst>
+              </p:cNvPr>
+              <p:cNvSpPr/>
+              <p:nvPr/>
+            </p:nvSpPr>
+            <p:spPr>
+              <a:xfrm>
+                <a:off x="4775215" y="1541599"/>
+                <a:ext cx="199001" cy="147850"/>
+              </a:xfrm>
+              <a:custGeom>
+                <a:avLst/>
+                <a:gdLst/>
+                <a:ahLst/>
+                <a:cxnLst/>
+                <a:rect l="l" t="t" r="r" b="b"/>
+                <a:pathLst>
+                  <a:path w="6252" h="4645" extrusionOk="0">
+                    <a:moveTo>
+                      <a:pt x="1834" y="1811"/>
+                    </a:moveTo>
+                    <a:cubicBezTo>
+                      <a:pt x="2168" y="1811"/>
+                      <a:pt x="2465" y="1989"/>
+                      <a:pt x="2644" y="2239"/>
+                    </a:cubicBezTo>
+                    <a:cubicBezTo>
+                      <a:pt x="2680" y="2394"/>
+                      <a:pt x="2739" y="2525"/>
+                      <a:pt x="2799" y="2656"/>
+                    </a:cubicBezTo>
+                    <a:cubicBezTo>
+                      <a:pt x="2799" y="2704"/>
+                      <a:pt x="2811" y="2751"/>
+                      <a:pt x="2811" y="2787"/>
+                    </a:cubicBezTo>
+                    <a:cubicBezTo>
+                      <a:pt x="2811" y="3335"/>
+                      <a:pt x="2382" y="3775"/>
+                      <a:pt x="1834" y="3775"/>
+                    </a:cubicBezTo>
+                    <a:cubicBezTo>
+                      <a:pt x="1298" y="3775"/>
+                      <a:pt x="846" y="3347"/>
+                      <a:pt x="846" y="2787"/>
+                    </a:cubicBezTo>
+                    <a:cubicBezTo>
+                      <a:pt x="846" y="2251"/>
+                      <a:pt x="1275" y="1811"/>
+                      <a:pt x="1834" y="1811"/>
+                    </a:cubicBezTo>
+                    <a:close/>
+                    <a:moveTo>
+                      <a:pt x="1834" y="1263"/>
+                    </a:moveTo>
+                    <a:cubicBezTo>
+                      <a:pt x="2108" y="1263"/>
+                      <a:pt x="2382" y="1334"/>
+                      <a:pt x="2620" y="1489"/>
+                    </a:cubicBezTo>
+                    <a:cubicBezTo>
+                      <a:pt x="2608" y="1561"/>
+                      <a:pt x="2608" y="1644"/>
+                      <a:pt x="2584" y="1727"/>
+                    </a:cubicBezTo>
+                    <a:cubicBezTo>
+                      <a:pt x="2382" y="1572"/>
+                      <a:pt x="2108" y="1465"/>
+                      <a:pt x="1822" y="1465"/>
+                    </a:cubicBezTo>
+                    <a:cubicBezTo>
+                      <a:pt x="1120" y="1465"/>
+                      <a:pt x="536" y="2049"/>
+                      <a:pt x="536" y="2763"/>
+                    </a:cubicBezTo>
+                    <a:cubicBezTo>
+                      <a:pt x="536" y="3477"/>
+                      <a:pt x="1108" y="4061"/>
+                      <a:pt x="1822" y="4061"/>
+                    </a:cubicBezTo>
+                    <a:cubicBezTo>
+                      <a:pt x="2453" y="4061"/>
+                      <a:pt x="2953" y="3632"/>
+                      <a:pt x="3096" y="3049"/>
+                    </a:cubicBezTo>
+                    <a:cubicBezTo>
+                      <a:pt x="3156" y="3108"/>
+                      <a:pt x="3215" y="3156"/>
+                      <a:pt x="3275" y="3216"/>
+                    </a:cubicBezTo>
+                    <a:cubicBezTo>
+                      <a:pt x="3084" y="3870"/>
+                      <a:pt x="2501" y="4299"/>
+                      <a:pt x="1834" y="4299"/>
+                    </a:cubicBezTo>
+                    <a:cubicBezTo>
+                      <a:pt x="1001" y="4299"/>
+                      <a:pt x="310" y="3608"/>
+                      <a:pt x="310" y="2775"/>
+                    </a:cubicBezTo>
+                    <a:cubicBezTo>
+                      <a:pt x="310" y="1942"/>
+                      <a:pt x="1001" y="1263"/>
+                      <a:pt x="1834" y="1263"/>
+                    </a:cubicBezTo>
+                    <a:close/>
+                    <a:moveTo>
+                      <a:pt x="4430" y="1"/>
+                    </a:moveTo>
+                    <a:cubicBezTo>
+                      <a:pt x="3644" y="1"/>
+                      <a:pt x="2977" y="501"/>
+                      <a:pt x="2703" y="1203"/>
+                    </a:cubicBezTo>
+                    <a:cubicBezTo>
+                      <a:pt x="2441" y="1049"/>
+                      <a:pt x="2144" y="977"/>
+                      <a:pt x="1834" y="977"/>
+                    </a:cubicBezTo>
+                    <a:cubicBezTo>
+                      <a:pt x="822" y="977"/>
+                      <a:pt x="1" y="1799"/>
+                      <a:pt x="1" y="2811"/>
+                    </a:cubicBezTo>
+                    <a:cubicBezTo>
+                      <a:pt x="1" y="3823"/>
+                      <a:pt x="822" y="4644"/>
+                      <a:pt x="1834" y="4644"/>
+                    </a:cubicBezTo>
+                    <a:cubicBezTo>
+                      <a:pt x="2608" y="4644"/>
+                      <a:pt x="3287" y="4168"/>
+                      <a:pt x="3561" y="3430"/>
+                    </a:cubicBezTo>
+                    <a:cubicBezTo>
+                      <a:pt x="3811" y="3573"/>
+                      <a:pt x="4108" y="3656"/>
+                      <a:pt x="4430" y="3656"/>
+                    </a:cubicBezTo>
+                    <a:cubicBezTo>
+                      <a:pt x="4846" y="3656"/>
+                      <a:pt x="5251" y="3513"/>
+                      <a:pt x="5585" y="3251"/>
+                    </a:cubicBezTo>
+                    <a:cubicBezTo>
+                      <a:pt x="5894" y="3001"/>
+                      <a:pt x="6132" y="2632"/>
+                      <a:pt x="6216" y="2239"/>
+                    </a:cubicBezTo>
+                    <a:cubicBezTo>
+                      <a:pt x="6228" y="2144"/>
+                      <a:pt x="6192" y="2049"/>
+                      <a:pt x="6097" y="2037"/>
+                    </a:cubicBezTo>
+                    <a:cubicBezTo>
+                      <a:pt x="6086" y="2035"/>
+                      <a:pt x="6076" y="2035"/>
+                      <a:pt x="6065" y="2035"/>
+                    </a:cubicBezTo>
+                    <a:cubicBezTo>
+                      <a:pt x="5991" y="2035"/>
+                      <a:pt x="5917" y="2072"/>
+                      <a:pt x="5906" y="2156"/>
+                    </a:cubicBezTo>
+                    <a:cubicBezTo>
+                      <a:pt x="5739" y="2835"/>
+                      <a:pt x="5144" y="3335"/>
+                      <a:pt x="4430" y="3335"/>
+                    </a:cubicBezTo>
+                    <a:cubicBezTo>
+                      <a:pt x="3882" y="3335"/>
+                      <a:pt x="3394" y="3037"/>
+                      <a:pt x="3120" y="2561"/>
+                    </a:cubicBezTo>
+                    <a:cubicBezTo>
+                      <a:pt x="3096" y="2406"/>
+                      <a:pt x="3037" y="2263"/>
+                      <a:pt x="2965" y="2120"/>
+                    </a:cubicBezTo>
+                    <a:cubicBezTo>
+                      <a:pt x="2763" y="1191"/>
+                      <a:pt x="3477" y="310"/>
+                      <a:pt x="4430" y="310"/>
+                    </a:cubicBezTo>
+                    <a:cubicBezTo>
+                      <a:pt x="5144" y="310"/>
+                      <a:pt x="5739" y="787"/>
+                      <a:pt x="5906" y="1489"/>
+                    </a:cubicBezTo>
+                    <a:cubicBezTo>
+                      <a:pt x="5916" y="1560"/>
+                      <a:pt x="5986" y="1613"/>
+                      <a:pt x="6058" y="1613"/>
+                    </a:cubicBezTo>
+                    <a:cubicBezTo>
+                      <a:pt x="6071" y="1613"/>
+                      <a:pt x="6084" y="1612"/>
+                      <a:pt x="6097" y="1608"/>
+                    </a:cubicBezTo>
+                    <a:cubicBezTo>
+                      <a:pt x="6192" y="1584"/>
+                      <a:pt x="6251" y="1501"/>
+                      <a:pt x="6216" y="1406"/>
+                    </a:cubicBezTo>
+                    <a:cubicBezTo>
+                      <a:pt x="6132" y="1013"/>
+                      <a:pt x="5906" y="656"/>
+                      <a:pt x="5585" y="394"/>
+                    </a:cubicBezTo>
+                    <a:cubicBezTo>
+                      <a:pt x="5251" y="132"/>
+                      <a:pt x="4846" y="1"/>
+                      <a:pt x="4430" y="1"/>
+                    </a:cubicBezTo>
+                    <a:close/>
+                  </a:path>
+                </a:pathLst>
+              </a:custGeom>
+              <a:solidFill>
+                <a:srgbClr val="657E93"/>
+              </a:solidFill>
+              <a:ln>
+                <a:solidFill>
+                  <a:schemeClr val="tx2">
+                    <a:lumMod val="75000"/>
+                  </a:schemeClr>
+                </a:solidFill>
+              </a:ln>
+            </p:spPr>
+            <p:txBody>
+              <a:bodyPr spcFirstLastPara="1" wrap="square" lIns="91425" tIns="91425" rIns="91425" bIns="91425" anchor="ctr" anchorCtr="0">
+                <a:noAutofit/>
+              </a:bodyPr>
+              <a:lstStyle/>
+              <a:p>
+                <a:pPr marL="0" lvl="0" indent="0" algn="l" rtl="0">
+                  <a:spcBef>
+                    <a:spcPts val="0"/>
+                  </a:spcBef>
+                  <a:spcAft>
+                    <a:spcPts val="0"/>
+                  </a:spcAft>
+                  <a:buNone/>
+                </a:pPr>
+                <a:endParaRPr/>
+              </a:p>
+            </p:txBody>
+          </p:sp>
+          <p:sp>
+            <p:nvSpPr>
+              <p:cNvPr id="51" name="Google Shape;11280;p61">
+                <a:extLst>
+                  <a:ext uri="{FF2B5EF4-FFF2-40B4-BE49-F238E27FC236}">
+                    <a16:creationId xmlns:a16="http://schemas.microsoft.com/office/drawing/2014/main" id="{40B00943-7B7A-40E4-B13A-485ED109BD12}"/>
+                  </a:ext>
+                </a:extLst>
+              </p:cNvPr>
+              <p:cNvSpPr/>
+              <p:nvPr/>
+            </p:nvSpPr>
+            <p:spPr>
+              <a:xfrm>
+                <a:off x="4901803" y="1574957"/>
+                <a:ext cx="28838" cy="50069"/>
+              </a:xfrm>
+              <a:custGeom>
+                <a:avLst/>
+                <a:gdLst/>
+                <a:ahLst/>
+                <a:cxnLst/>
+                <a:rect l="l" t="t" r="r" b="b"/>
+                <a:pathLst>
+                  <a:path w="906" h="1573" extrusionOk="0">
+                    <a:moveTo>
+                      <a:pt x="429" y="322"/>
+                    </a:moveTo>
+                    <a:lnTo>
+                      <a:pt x="429" y="596"/>
+                    </a:lnTo>
+                    <a:cubicBezTo>
+                      <a:pt x="310" y="548"/>
+                      <a:pt x="274" y="513"/>
+                      <a:pt x="274" y="453"/>
+                    </a:cubicBezTo>
+                    <a:cubicBezTo>
+                      <a:pt x="274" y="358"/>
+                      <a:pt x="358" y="334"/>
+                      <a:pt x="429" y="322"/>
+                    </a:cubicBezTo>
+                    <a:close/>
+                    <a:moveTo>
+                      <a:pt x="512" y="894"/>
+                    </a:moveTo>
+                    <a:cubicBezTo>
+                      <a:pt x="631" y="941"/>
+                      <a:pt x="667" y="1001"/>
+                      <a:pt x="667" y="1072"/>
+                    </a:cubicBezTo>
+                    <a:cubicBezTo>
+                      <a:pt x="667" y="1167"/>
+                      <a:pt x="608" y="1215"/>
+                      <a:pt x="512" y="1227"/>
+                    </a:cubicBezTo>
+                    <a:lnTo>
+                      <a:pt x="512" y="894"/>
+                    </a:lnTo>
+                    <a:close/>
+                    <a:moveTo>
+                      <a:pt x="453" y="1"/>
+                    </a:moveTo>
+                    <a:cubicBezTo>
+                      <a:pt x="429" y="1"/>
+                      <a:pt x="393" y="24"/>
+                      <a:pt x="393" y="48"/>
+                    </a:cubicBezTo>
+                    <a:lnTo>
+                      <a:pt x="393" y="108"/>
+                    </a:lnTo>
+                    <a:cubicBezTo>
+                      <a:pt x="167" y="132"/>
+                      <a:pt x="24" y="251"/>
+                      <a:pt x="24" y="477"/>
+                    </a:cubicBezTo>
+                    <a:cubicBezTo>
+                      <a:pt x="24" y="715"/>
+                      <a:pt x="203" y="798"/>
+                      <a:pt x="393" y="870"/>
+                    </a:cubicBezTo>
+                    <a:lnTo>
+                      <a:pt x="393" y="1239"/>
+                    </a:lnTo>
+                    <a:cubicBezTo>
+                      <a:pt x="286" y="1227"/>
+                      <a:pt x="250" y="1179"/>
+                      <a:pt x="155" y="1120"/>
+                    </a:cubicBezTo>
+                    <a:cubicBezTo>
+                      <a:pt x="138" y="1108"/>
+                      <a:pt x="122" y="1102"/>
+                      <a:pt x="106" y="1102"/>
+                    </a:cubicBezTo>
+                    <a:cubicBezTo>
+                      <a:pt x="46" y="1102"/>
+                      <a:pt x="0" y="1182"/>
+                      <a:pt x="0" y="1239"/>
+                    </a:cubicBezTo>
+                    <a:cubicBezTo>
+                      <a:pt x="0" y="1275"/>
+                      <a:pt x="12" y="1298"/>
+                      <a:pt x="24" y="1310"/>
+                    </a:cubicBezTo>
+                    <a:cubicBezTo>
+                      <a:pt x="96" y="1417"/>
+                      <a:pt x="262" y="1465"/>
+                      <a:pt x="393" y="1465"/>
+                    </a:cubicBezTo>
+                    <a:lnTo>
+                      <a:pt x="393" y="1525"/>
+                    </a:lnTo>
+                    <a:cubicBezTo>
+                      <a:pt x="393" y="1548"/>
+                      <a:pt x="429" y="1572"/>
+                      <a:pt x="453" y="1572"/>
+                    </a:cubicBezTo>
+                    <a:cubicBezTo>
+                      <a:pt x="488" y="1572"/>
+                      <a:pt x="512" y="1548"/>
+                      <a:pt x="512" y="1525"/>
+                    </a:cubicBezTo>
+                    <a:lnTo>
+                      <a:pt x="512" y="1465"/>
+                    </a:lnTo>
+                    <a:cubicBezTo>
+                      <a:pt x="715" y="1429"/>
+                      <a:pt x="869" y="1298"/>
+                      <a:pt x="869" y="1060"/>
+                    </a:cubicBezTo>
+                    <a:cubicBezTo>
+                      <a:pt x="905" y="810"/>
+                      <a:pt x="739" y="715"/>
+                      <a:pt x="536" y="644"/>
+                    </a:cubicBezTo>
+                    <a:lnTo>
+                      <a:pt x="536" y="298"/>
+                    </a:lnTo>
+                    <a:cubicBezTo>
+                      <a:pt x="608" y="298"/>
+                      <a:pt x="631" y="322"/>
+                      <a:pt x="715" y="358"/>
+                    </a:cubicBezTo>
+                    <a:cubicBezTo>
+                      <a:pt x="728" y="367"/>
+                      <a:pt x="742" y="372"/>
+                      <a:pt x="758" y="372"/>
+                    </a:cubicBezTo>
+                    <a:cubicBezTo>
+                      <a:pt x="784" y="372"/>
+                      <a:pt x="811" y="355"/>
+                      <a:pt x="834" y="310"/>
+                    </a:cubicBezTo>
+                    <a:cubicBezTo>
+                      <a:pt x="858" y="274"/>
+                      <a:pt x="869" y="215"/>
+                      <a:pt x="810" y="167"/>
+                    </a:cubicBezTo>
+                    <a:cubicBezTo>
+                      <a:pt x="739" y="108"/>
+                      <a:pt x="619" y="96"/>
+                      <a:pt x="512" y="96"/>
+                    </a:cubicBezTo>
+                    <a:lnTo>
+                      <a:pt x="512" y="48"/>
+                    </a:lnTo>
+                    <a:cubicBezTo>
+                      <a:pt x="512" y="24"/>
+                      <a:pt x="488" y="1"/>
+                      <a:pt x="453" y="1"/>
+                    </a:cubicBezTo>
+                    <a:close/>
+                  </a:path>
+                </a:pathLst>
+              </a:custGeom>
+              <a:solidFill>
+                <a:srgbClr val="657E93"/>
+              </a:solidFill>
+              <a:ln>
+                <a:solidFill>
+                  <a:schemeClr val="tx2">
+                    <a:lumMod val="75000"/>
+                  </a:schemeClr>
+                </a:solidFill>
+              </a:ln>
+            </p:spPr>
+            <p:txBody>
+              <a:bodyPr spcFirstLastPara="1" wrap="square" lIns="91425" tIns="91425" rIns="91425" bIns="91425" anchor="ctr" anchorCtr="0">
+                <a:noAutofit/>
+              </a:bodyPr>
+              <a:lstStyle/>
+              <a:p>
+                <a:pPr marL="0" lvl="0" indent="0" algn="l" rtl="0">
+                  <a:spcBef>
+                    <a:spcPts val="0"/>
+                  </a:spcBef>
+                  <a:spcAft>
+                    <a:spcPts val="0"/>
+                  </a:spcAft>
+                  <a:buNone/>
+                </a:pPr>
+                <a:endParaRPr/>
+              </a:p>
+            </p:txBody>
+          </p:sp>
+          <p:sp>
+            <p:nvSpPr>
+              <p:cNvPr id="52" name="Google Shape;11281;p61">
+                <a:extLst>
+                  <a:ext uri="{FF2B5EF4-FFF2-40B4-BE49-F238E27FC236}">
+                    <a16:creationId xmlns:a16="http://schemas.microsoft.com/office/drawing/2014/main" id="{6F91FCFC-F987-47FE-8716-6747A48B41C5}"/>
+                  </a:ext>
+                </a:extLst>
+              </p:cNvPr>
+              <p:cNvSpPr/>
+              <p:nvPr/>
+            </p:nvSpPr>
+            <p:spPr>
+              <a:xfrm>
+                <a:off x="4670239" y="1657269"/>
+                <a:ext cx="359679" cy="206163"/>
+              </a:xfrm>
+              <a:custGeom>
+                <a:avLst/>
+                <a:gdLst/>
+                <a:ahLst/>
+                <a:cxnLst/>
+                <a:rect l="l" t="t" r="r" b="b"/>
+                <a:pathLst>
+                  <a:path w="11300" h="6477" extrusionOk="0">
+                    <a:moveTo>
+                      <a:pt x="3590" y="1935"/>
+                    </a:moveTo>
+                    <a:cubicBezTo>
+                      <a:pt x="3607" y="1935"/>
+                      <a:pt x="3623" y="1948"/>
+                      <a:pt x="3632" y="1975"/>
+                    </a:cubicBezTo>
+                    <a:cubicBezTo>
+                      <a:pt x="3715" y="2129"/>
+                      <a:pt x="4727" y="4832"/>
+                      <a:pt x="4751" y="4939"/>
+                    </a:cubicBezTo>
+                    <a:cubicBezTo>
+                      <a:pt x="4775" y="4951"/>
+                      <a:pt x="4751" y="4975"/>
+                      <a:pt x="4727" y="4987"/>
+                    </a:cubicBezTo>
+                    <a:lnTo>
+                      <a:pt x="4013" y="5261"/>
+                    </a:lnTo>
+                    <a:cubicBezTo>
+                      <a:pt x="3965" y="5130"/>
+                      <a:pt x="2941" y="2403"/>
+                      <a:pt x="2870" y="2213"/>
+                    </a:cubicBezTo>
+                    <a:lnTo>
+                      <a:pt x="3572" y="1939"/>
+                    </a:lnTo>
+                    <a:cubicBezTo>
+                      <a:pt x="3578" y="1936"/>
+                      <a:pt x="3584" y="1935"/>
+                      <a:pt x="3590" y="1935"/>
+                    </a:cubicBezTo>
+                    <a:close/>
+                    <a:moveTo>
+                      <a:pt x="2584" y="2308"/>
+                    </a:moveTo>
+                    <a:lnTo>
+                      <a:pt x="3727" y="5368"/>
+                    </a:lnTo>
+                    <a:cubicBezTo>
+                      <a:pt x="3180" y="5570"/>
+                      <a:pt x="1810" y="6082"/>
+                      <a:pt x="1584" y="6166"/>
+                    </a:cubicBezTo>
+                    <a:cubicBezTo>
+                      <a:pt x="1577" y="6172"/>
+                      <a:pt x="1569" y="6175"/>
+                      <a:pt x="1560" y="6175"/>
+                    </a:cubicBezTo>
+                    <a:cubicBezTo>
+                      <a:pt x="1537" y="6175"/>
+                      <a:pt x="1509" y="6156"/>
+                      <a:pt x="1501" y="6130"/>
+                    </a:cubicBezTo>
+                    <a:lnTo>
+                      <a:pt x="394" y="3201"/>
+                    </a:lnTo>
+                    <a:cubicBezTo>
+                      <a:pt x="382" y="3177"/>
+                      <a:pt x="394" y="3130"/>
+                      <a:pt x="441" y="3118"/>
+                    </a:cubicBezTo>
+                    <a:cubicBezTo>
+                      <a:pt x="1144" y="2844"/>
+                      <a:pt x="2096" y="2487"/>
+                      <a:pt x="2584" y="2308"/>
+                    </a:cubicBezTo>
+                    <a:close/>
+                    <a:moveTo>
+                      <a:pt x="10358" y="1"/>
+                    </a:moveTo>
+                    <a:cubicBezTo>
+                      <a:pt x="10108" y="1"/>
+                      <a:pt x="9869" y="131"/>
+                      <a:pt x="9692" y="308"/>
+                    </a:cubicBezTo>
+                    <a:lnTo>
+                      <a:pt x="7966" y="1737"/>
+                    </a:lnTo>
+                    <a:cubicBezTo>
+                      <a:pt x="7883" y="1522"/>
+                      <a:pt x="7668" y="1308"/>
+                      <a:pt x="7263" y="1308"/>
+                    </a:cubicBezTo>
+                    <a:cubicBezTo>
+                      <a:pt x="6756" y="1308"/>
+                      <a:pt x="6387" y="1304"/>
+                      <a:pt x="6108" y="1304"/>
+                    </a:cubicBezTo>
+                    <a:cubicBezTo>
+                      <a:pt x="5503" y="1304"/>
+                      <a:pt x="5318" y="1321"/>
+                      <a:pt x="5049" y="1427"/>
+                    </a:cubicBezTo>
+                    <a:lnTo>
+                      <a:pt x="3953" y="1868"/>
+                    </a:lnTo>
+                    <a:lnTo>
+                      <a:pt x="3930" y="1820"/>
+                    </a:lnTo>
+                    <a:cubicBezTo>
+                      <a:pt x="3875" y="1675"/>
+                      <a:pt x="3745" y="1592"/>
+                      <a:pt x="3597" y="1592"/>
+                    </a:cubicBezTo>
+                    <a:cubicBezTo>
+                      <a:pt x="3550" y="1592"/>
+                      <a:pt x="3502" y="1600"/>
+                      <a:pt x="3453" y="1618"/>
+                    </a:cubicBezTo>
+                    <a:lnTo>
+                      <a:pt x="2620" y="1927"/>
+                    </a:lnTo>
+                    <a:cubicBezTo>
+                      <a:pt x="2251" y="2058"/>
+                      <a:pt x="1108" y="2510"/>
+                      <a:pt x="298" y="2808"/>
+                    </a:cubicBezTo>
+                    <a:cubicBezTo>
+                      <a:pt x="96" y="2880"/>
+                      <a:pt x="1" y="3106"/>
+                      <a:pt x="84" y="3308"/>
+                    </a:cubicBezTo>
+                    <a:lnTo>
+                      <a:pt x="1179" y="6225"/>
+                    </a:lnTo>
+                    <a:cubicBezTo>
+                      <a:pt x="1234" y="6389"/>
+                      <a:pt x="1379" y="6476"/>
+                      <a:pt x="1540" y="6476"/>
+                    </a:cubicBezTo>
+                    <a:cubicBezTo>
+                      <a:pt x="1590" y="6476"/>
+                      <a:pt x="1641" y="6468"/>
+                      <a:pt x="1691" y="6451"/>
+                    </a:cubicBezTo>
+                    <a:cubicBezTo>
+                      <a:pt x="1941" y="6368"/>
+                      <a:pt x="3608" y="5725"/>
+                      <a:pt x="3977" y="5594"/>
+                    </a:cubicBezTo>
+                    <a:lnTo>
+                      <a:pt x="4858" y="5261"/>
+                    </a:lnTo>
+                    <a:cubicBezTo>
+                      <a:pt x="5049" y="5189"/>
+                      <a:pt x="5144" y="4975"/>
+                      <a:pt x="5061" y="4785"/>
+                    </a:cubicBezTo>
+                    <a:lnTo>
+                      <a:pt x="5049" y="4737"/>
+                    </a:lnTo>
+                    <a:cubicBezTo>
+                      <a:pt x="5620" y="4499"/>
+                      <a:pt x="5632" y="4475"/>
+                      <a:pt x="6228" y="4475"/>
+                    </a:cubicBezTo>
+                    <a:cubicBezTo>
+                      <a:pt x="6311" y="4475"/>
+                      <a:pt x="6394" y="4404"/>
+                      <a:pt x="6394" y="4308"/>
+                    </a:cubicBezTo>
+                    <a:cubicBezTo>
+                      <a:pt x="6394" y="4225"/>
+                      <a:pt x="6311" y="4142"/>
+                      <a:pt x="6228" y="4142"/>
+                    </a:cubicBezTo>
+                    <a:cubicBezTo>
+                      <a:pt x="5585" y="4142"/>
+                      <a:pt x="5525" y="4189"/>
+                      <a:pt x="4930" y="4439"/>
+                    </a:cubicBezTo>
+                    <a:lnTo>
+                      <a:pt x="4073" y="2153"/>
+                    </a:lnTo>
+                    <a:lnTo>
+                      <a:pt x="5168" y="1689"/>
+                    </a:lnTo>
+                    <a:cubicBezTo>
+                      <a:pt x="5361" y="1615"/>
+                      <a:pt x="5513" y="1601"/>
+                      <a:pt x="5986" y="1601"/>
+                    </a:cubicBezTo>
+                    <a:cubicBezTo>
+                      <a:pt x="6270" y="1601"/>
+                      <a:pt x="6670" y="1606"/>
+                      <a:pt x="7263" y="1606"/>
+                    </a:cubicBezTo>
+                    <a:cubicBezTo>
+                      <a:pt x="7442" y="1606"/>
+                      <a:pt x="7561" y="1665"/>
+                      <a:pt x="7644" y="1784"/>
+                    </a:cubicBezTo>
+                    <a:cubicBezTo>
+                      <a:pt x="7704" y="1868"/>
+                      <a:pt x="7704" y="1963"/>
+                      <a:pt x="7716" y="1987"/>
+                    </a:cubicBezTo>
+                    <a:cubicBezTo>
+                      <a:pt x="7716" y="2046"/>
+                      <a:pt x="7668" y="2344"/>
+                      <a:pt x="7382" y="2391"/>
+                    </a:cubicBezTo>
+                    <a:cubicBezTo>
+                      <a:pt x="6942" y="2463"/>
+                      <a:pt x="5989" y="2594"/>
+                      <a:pt x="5978" y="2594"/>
+                    </a:cubicBezTo>
+                    <a:cubicBezTo>
+                      <a:pt x="5882" y="2606"/>
+                      <a:pt x="5823" y="2689"/>
+                      <a:pt x="5835" y="2772"/>
+                    </a:cubicBezTo>
+                    <a:cubicBezTo>
+                      <a:pt x="5858" y="2844"/>
+                      <a:pt x="5918" y="2903"/>
+                      <a:pt x="6001" y="2903"/>
+                    </a:cubicBezTo>
+                    <a:lnTo>
+                      <a:pt x="6037" y="2903"/>
+                    </a:lnTo>
+                    <a:cubicBezTo>
+                      <a:pt x="6049" y="2903"/>
+                      <a:pt x="7001" y="2772"/>
+                      <a:pt x="7442" y="2701"/>
+                    </a:cubicBezTo>
+                    <a:cubicBezTo>
+                      <a:pt x="7859" y="2630"/>
+                      <a:pt x="8014" y="2284"/>
+                      <a:pt x="8037" y="2046"/>
+                    </a:cubicBezTo>
+                    <a:lnTo>
+                      <a:pt x="9919" y="498"/>
+                    </a:lnTo>
+                    <a:cubicBezTo>
+                      <a:pt x="10039" y="385"/>
+                      <a:pt x="10193" y="287"/>
+                      <a:pt x="10356" y="287"/>
+                    </a:cubicBezTo>
+                    <a:cubicBezTo>
+                      <a:pt x="10451" y="287"/>
+                      <a:pt x="10549" y="320"/>
+                      <a:pt x="10645" y="403"/>
+                    </a:cubicBezTo>
+                    <a:cubicBezTo>
+                      <a:pt x="10942" y="701"/>
+                      <a:pt x="10681" y="1058"/>
+                      <a:pt x="10597" y="1141"/>
+                    </a:cubicBezTo>
+                    <a:cubicBezTo>
+                      <a:pt x="10526" y="1213"/>
+                      <a:pt x="8240" y="3677"/>
+                      <a:pt x="8240" y="3677"/>
+                    </a:cubicBezTo>
+                    <a:cubicBezTo>
+                      <a:pt x="7906" y="4070"/>
+                      <a:pt x="7466" y="4130"/>
+                      <a:pt x="7263" y="4130"/>
+                    </a:cubicBezTo>
+                    <a:lnTo>
+                      <a:pt x="6966" y="4130"/>
+                    </a:lnTo>
+                    <a:cubicBezTo>
+                      <a:pt x="6882" y="4130"/>
+                      <a:pt x="6811" y="4201"/>
+                      <a:pt x="6811" y="4296"/>
+                    </a:cubicBezTo>
+                    <a:cubicBezTo>
+                      <a:pt x="6811" y="4380"/>
+                      <a:pt x="6882" y="4463"/>
+                      <a:pt x="6966" y="4463"/>
+                    </a:cubicBezTo>
+                    <a:lnTo>
+                      <a:pt x="7287" y="4463"/>
+                    </a:lnTo>
+                    <a:cubicBezTo>
+                      <a:pt x="7502" y="4439"/>
+                      <a:pt x="8061" y="4368"/>
+                      <a:pt x="8478" y="3892"/>
+                    </a:cubicBezTo>
+                    <a:lnTo>
+                      <a:pt x="10835" y="1344"/>
+                    </a:lnTo>
+                    <a:cubicBezTo>
+                      <a:pt x="11062" y="1153"/>
+                      <a:pt x="11300" y="629"/>
+                      <a:pt x="10871" y="213"/>
+                    </a:cubicBezTo>
+                    <a:cubicBezTo>
+                      <a:pt x="10706" y="62"/>
+                      <a:pt x="10530" y="1"/>
+                      <a:pt x="10358" y="1"/>
+                    </a:cubicBezTo>
+                    <a:close/>
+                  </a:path>
+                </a:pathLst>
+              </a:custGeom>
+              <a:solidFill>
+                <a:srgbClr val="657E93"/>
+              </a:solidFill>
+              <a:ln>
+                <a:solidFill>
+                  <a:schemeClr val="tx2">
+                    <a:lumMod val="75000"/>
+                  </a:schemeClr>
+                </a:solidFill>
+              </a:ln>
+            </p:spPr>
+            <p:txBody>
+              <a:bodyPr spcFirstLastPara="1" wrap="square" lIns="91425" tIns="91425" rIns="91425" bIns="91425" anchor="ctr" anchorCtr="0">
+                <a:noAutofit/>
+              </a:bodyPr>
+              <a:lstStyle/>
+              <a:p>
+                <a:pPr marL="0" lvl="0" indent="0" algn="l" rtl="0">
+                  <a:spcBef>
+                    <a:spcPts val="0"/>
+                  </a:spcBef>
+                  <a:spcAft>
+                    <a:spcPts val="0"/>
+                  </a:spcAft>
+                  <a:buNone/>
+                </a:pPr>
+                <a:endParaRPr/>
+              </a:p>
+            </p:txBody>
+          </p:sp>
+        </p:grpSp>
+      </p:grpSp>
+      <p:pic>
+        <p:nvPicPr>
+          <p:cNvPr id="6" name="Graphic 5">
+            <a:extLst>
+              <a:ext uri="{FF2B5EF4-FFF2-40B4-BE49-F238E27FC236}">
+                <a16:creationId xmlns:a16="http://schemas.microsoft.com/office/drawing/2014/main" id="{E4F4AB1C-8971-45CE-9BDE-BB4CBFF16B4D}"/>
+              </a:ext>
+            </a:extLst>
+          </p:cNvPr>
+          <p:cNvPicPr>
+            <a:picLocks noChangeAspect="1"/>
+          </p:cNvPicPr>
+          <p:nvPr/>
+        </p:nvPicPr>
+        <p:blipFill>
+          <a:blip r:embed="rId3" cstate="print">
+            <a:extLst>
+              <a:ext uri="{28A0092B-C50C-407E-A947-70E740481C1C}">
+                <a14:useLocalDpi xmlns:a14="http://schemas.microsoft.com/office/drawing/2010/main" val="0"/>
+              </a:ext>
+              <a:ext uri="{96DAC541-7B7A-43D3-8B79-37D633B846F1}">
+                <asvg:svgBlip xmlns:asvg="http://schemas.microsoft.com/office/drawing/2016/SVG/main" xmlns="" r:embed="rId4"/>
+              </a:ext>
+            </a:extLst>
+          </a:blip>
+          <a:stretch>
+            <a:fillRect/>
+          </a:stretch>
+        </p:blipFill>
+        <p:spPr>
+          <a:xfrm>
+            <a:off x="10513062" y="5569489"/>
+            <a:ext cx="1328592" cy="1328592"/>
+          </a:xfrm>
+          <a:prstGeom prst="rect">
+            <a:avLst/>
+          </a:prstGeom>
+        </p:spPr>
+      </p:pic>
+      <p:sp>
+        <p:nvSpPr>
+          <p:cNvPr id="14" name="TextBox 13">
+            <a:extLst>
+              <a:ext uri="{FF2B5EF4-FFF2-40B4-BE49-F238E27FC236}">
+                <a16:creationId xmlns:a16="http://schemas.microsoft.com/office/drawing/2014/main" id="{341A6B67-C002-4904-99A6-0E34103447D9}"/>
+              </a:ext>
+            </a:extLst>
+          </p:cNvPr>
+          <p:cNvSpPr txBox="1"/>
+          <p:nvPr/>
+        </p:nvSpPr>
+        <p:spPr>
+          <a:xfrm>
+            <a:off x="883420" y="2439602"/>
+            <a:ext cx="11308580" cy="954107"/>
+          </a:xfrm>
+          <a:prstGeom prst="rect">
+            <a:avLst/>
+          </a:prstGeom>
+          <a:noFill/>
+        </p:spPr>
+        <p:txBody>
+          <a:bodyPr wrap="square" rtlCol="0">
+            <a:spAutoFit/>
+          </a:bodyPr>
+          <a:lstStyle/>
+          <a:p>
+            <a:r>
+              <a:rPr lang="en-US" sz="2800" dirty="0" smtClean="0"/>
+              <a:t>+ </a:t>
+            </a:r>
+            <a:r>
+              <a:rPr lang="en-US" sz="2800" dirty="0" err="1" smtClean="0"/>
+              <a:t>Ngay</a:t>
+            </a:r>
+            <a:r>
+              <a:rPr lang="en-US" sz="2800" dirty="0" smtClean="0"/>
+              <a:t> </a:t>
+            </a:r>
+            <a:r>
+              <a:rPr lang="en-US" sz="2800" dirty="0" err="1" smtClean="0"/>
+              <a:t>cả</a:t>
+            </a:r>
+            <a:r>
+              <a:rPr lang="en-US" sz="2800" dirty="0" smtClean="0"/>
+              <a:t> </a:t>
+            </a:r>
+            <a:r>
+              <a:rPr lang="en-US" sz="2800" dirty="0" err="1" smtClean="0"/>
+              <a:t>khi</a:t>
+            </a:r>
+            <a:r>
+              <a:rPr lang="en-US" sz="2800" dirty="0" smtClean="0"/>
+              <a:t> QR code </a:t>
+            </a:r>
+            <a:r>
+              <a:rPr lang="en-US" sz="2800" dirty="0" err="1" smtClean="0"/>
+              <a:t>bị</a:t>
+            </a:r>
+            <a:r>
+              <a:rPr lang="en-US" sz="2800" dirty="0" smtClean="0"/>
+              <a:t> </a:t>
+            </a:r>
+            <a:r>
+              <a:rPr lang="en-US" sz="2800" dirty="0" err="1" smtClean="0"/>
+              <a:t>bẩn</a:t>
+            </a:r>
+            <a:r>
+              <a:rPr lang="en-US" sz="2800" dirty="0" smtClean="0"/>
+              <a:t> hay </a:t>
+            </a:r>
+            <a:r>
+              <a:rPr lang="en-US" sz="2800" dirty="0" err="1" smtClean="0"/>
+              <a:t>hỏng</a:t>
+            </a:r>
+            <a:r>
+              <a:rPr lang="en-US" sz="2800" dirty="0" smtClean="0"/>
+              <a:t>, ta </a:t>
+            </a:r>
+            <a:r>
+              <a:rPr lang="en-US" sz="2800" dirty="0" err="1" smtClean="0"/>
+              <a:t>vẫn</a:t>
+            </a:r>
+            <a:r>
+              <a:rPr lang="en-US" sz="2800" dirty="0" smtClean="0"/>
+              <a:t> </a:t>
+            </a:r>
+            <a:r>
+              <a:rPr lang="en-US" sz="2800" dirty="0" err="1" smtClean="0"/>
+              <a:t>có</a:t>
+            </a:r>
+            <a:r>
+              <a:rPr lang="en-US" sz="2800" dirty="0" smtClean="0"/>
+              <a:t> </a:t>
+            </a:r>
+            <a:r>
+              <a:rPr lang="en-US" sz="2800" dirty="0" err="1" smtClean="0"/>
+              <a:t>thể</a:t>
+            </a:r>
+            <a:r>
+              <a:rPr lang="en-US" sz="2800" dirty="0" smtClean="0"/>
+              <a:t> </a:t>
+            </a:r>
+            <a:r>
+              <a:rPr lang="en-US" sz="2800" dirty="0" err="1" smtClean="0"/>
+              <a:t>khôi</a:t>
+            </a:r>
+            <a:r>
+              <a:rPr lang="en-US" sz="2800" dirty="0" smtClean="0"/>
+              <a:t> </a:t>
+            </a:r>
+            <a:r>
+              <a:rPr lang="en-US" sz="2800" dirty="0" err="1" smtClean="0"/>
+              <a:t>phục</a:t>
+            </a:r>
+            <a:r>
+              <a:rPr lang="en-US" sz="2800" dirty="0" smtClean="0"/>
+              <a:t> </a:t>
+            </a:r>
+            <a:r>
+              <a:rPr lang="en-US" sz="2800" dirty="0" err="1" smtClean="0"/>
+              <a:t>thông</a:t>
+            </a:r>
+            <a:r>
+              <a:rPr lang="en-US" sz="2800" dirty="0" smtClean="0"/>
+              <a:t> tin </a:t>
+            </a:r>
+            <a:r>
+              <a:rPr lang="en-US" sz="2800" dirty="0" err="1" smtClean="0"/>
+              <a:t>chứa</a:t>
+            </a:r>
+            <a:r>
+              <a:rPr lang="en-US" sz="2800" dirty="0" smtClean="0"/>
+              <a:t> </a:t>
+            </a:r>
+            <a:r>
+              <a:rPr lang="en-US" sz="2800" dirty="0" err="1" smtClean="0"/>
+              <a:t>trong</a:t>
+            </a:r>
+            <a:r>
+              <a:rPr lang="en-US" sz="2800" dirty="0" smtClean="0"/>
+              <a:t> </a:t>
+            </a:r>
+            <a:r>
+              <a:rPr lang="en-US" sz="2800" dirty="0" err="1" smtClean="0"/>
+              <a:t>nó</a:t>
+            </a:r>
+            <a:endParaRPr lang="en-US" sz="2800" dirty="0"/>
+          </a:p>
+        </p:txBody>
+      </p:sp>
+      <p:sp>
+        <p:nvSpPr>
+          <p:cNvPr id="15" name="TextBox 14">
+            <a:extLst>
+              <a:ext uri="{FF2B5EF4-FFF2-40B4-BE49-F238E27FC236}">
+                <a16:creationId xmlns:a16="http://schemas.microsoft.com/office/drawing/2014/main" id="{341A6B67-C002-4904-99A6-0E34103447D9}"/>
+              </a:ext>
+            </a:extLst>
+          </p:cNvPr>
+          <p:cNvSpPr txBox="1"/>
+          <p:nvPr/>
+        </p:nvSpPr>
+        <p:spPr>
+          <a:xfrm>
+            <a:off x="883420" y="3978707"/>
+            <a:ext cx="11308580" cy="954107"/>
+          </a:xfrm>
+          <a:prstGeom prst="rect">
+            <a:avLst/>
+          </a:prstGeom>
+          <a:noFill/>
+        </p:spPr>
+        <p:txBody>
+          <a:bodyPr wrap="square" rtlCol="0">
+            <a:spAutoFit/>
+          </a:bodyPr>
+          <a:lstStyle/>
+          <a:p>
+            <a:r>
+              <a:rPr lang="en-US" sz="2800" dirty="0" smtClean="0"/>
+              <a:t>+ </a:t>
+            </a:r>
+            <a:r>
+              <a:rPr lang="vi-VN" sz="2800" dirty="0" smtClean="0"/>
+              <a:t>Có </a:t>
+            </a:r>
+            <a:r>
+              <a:rPr lang="vi-VN" sz="2800" dirty="0"/>
+              <a:t>thể đọc được thông tin bằng kỹ thuật xử lý hình ảnh của Camera</a:t>
+            </a:r>
+          </a:p>
+          <a:p>
+            <a:endParaRPr lang="en-US" sz="2800" dirty="0"/>
+          </a:p>
+        </p:txBody>
+      </p:sp>
+    </p:spTree>
+    <p:extLst>
+      <p:ext uri="{BB962C8B-B14F-4D97-AF65-F5344CB8AC3E}">
+        <p14:creationId xmlns:p14="http://schemas.microsoft.com/office/powerpoint/2010/main" val="2725135341"/>
+      </p:ext>
+    </p:extLst>
+  </p:cSld>
+  <p:clrMapOvr>
+    <a:masterClrMapping/>
+  </p:clrMapOvr>
+  <p:timing>
+    <p:tnLst>
+      <p:par>
+        <p:cTn id="1" dur="indefinite" restart="never" nodeType="tmRoot">
+          <p:childTnLst>
+            <p:seq concurrent="1" nextAc="seek">
+              <p:cTn id="2" dur="indefinite" nodeType="mainSeq">
+                <p:childTnLst>
+                  <p:par>
+                    <p:cTn id="3" fill="hold">
+                      <p:stCondLst>
+                        <p:cond delay="indefinite"/>
+                        <p:cond evt="onBegin" delay="0">
+                          <p:tn val="2"/>
+                        </p:cond>
+                      </p:stCondLst>
+                      <p:childTnLst>
+                        <p:par>
+                          <p:cTn id="4" fill="hold">
+                            <p:stCondLst>
+                              <p:cond delay="0"/>
+                            </p:stCondLst>
+                            <p:childTnLst>
+                              <p:par>
+                                <p:cTn id="5" presetID="42" presetClass="entr" presetSubtype="0" fill="hold" grpId="0" nodeType="withEffect">
+                                  <p:stCondLst>
+                                    <p:cond delay="0"/>
+                                  </p:stCondLst>
+                                  <p:childTnLst>
+                                    <p:set>
+                                      <p:cBhvr>
+                                        <p:cTn id="6" dur="1" fill="hold">
                                           <p:stCondLst>
                                             <p:cond delay="0"/>
                                           </p:stCondLst>
@@ -17351,7 +19832,7 @@
                                     </p:set>
                                     <p:animEffect transition="in" filter="fade">
                                       <p:cBhvr>
-                                        <p:cTn id="21" dur="1000"/>
+                                        <p:cTn id="7" dur="1000"/>
                                         <p:tgtEl>
                                           <p:spTgt spid="14"/>
                                         </p:tgtEl>
@@ -17359,7 +19840,7 @@
                                     </p:animEffect>
                                     <p:anim calcmode="lin" valueType="num">
                                       <p:cBhvr>
-                                        <p:cTn id="22" dur="1000" fill="hold"/>
+                                        <p:cTn id="8" dur="1000" fill="hold"/>
                                         <p:tgtEl>
                                           <p:spTgt spid="14"/>
                                         </p:tgtEl>
@@ -17382,9 +19863,108 @@
                                     </p:anim>
                                     <p:anim calcmode="lin" valueType="num">
                                       <p:cBhvr>
-                                        <p:cTn id="23" dur="1000" fill="hold"/>
+                                        <p:cTn id="9" dur="1000" fill="hold"/>
                                         <p:tgtEl>
                                           <p:spTgt spid="14"/>
+                                        </p:tgtEl>
+                                        <p:attrNameLst>
+                                          <p:attrName>ppt_y</p:attrName>
+                                        </p:attrNameLst>
+                                      </p:cBhvr>
+                                      <p:tavLst>
+                                        <p:tav tm="0">
+                                          <p:val>
+                                            <p:strVal val="#ppt_y+.1"/>
+                                          </p:val>
+                                        </p:tav>
+                                        <p:tav tm="100000">
+                                          <p:val>
+                                            <p:strVal val="#ppt_y"/>
+                                          </p:val>
+                                        </p:tav>
+                                      </p:tavLst>
+                                    </p:anim>
+                                  </p:childTnLst>
+                                </p:cTn>
+                              </p:par>
+                            </p:childTnLst>
+                          </p:cTn>
+                        </p:par>
+                      </p:childTnLst>
+                    </p:cTn>
+                  </p:par>
+                  <p:par>
+                    <p:cTn id="10" fill="hold">
+                      <p:stCondLst>
+                        <p:cond delay="indefinite"/>
+                      </p:stCondLst>
+                      <p:childTnLst>
+                        <p:par>
+                          <p:cTn id="11" fill="hold">
+                            <p:stCondLst>
+                              <p:cond delay="0"/>
+                            </p:stCondLst>
+                            <p:childTnLst>
+                              <p:par>
+                                <p:cTn id="12" presetID="42" presetClass="entr" presetSubtype="0" fill="hold" grpId="0" nodeType="clickEffect">
+                                  <p:stCondLst>
+                                    <p:cond delay="0"/>
+                                  </p:stCondLst>
+                                  <p:childTnLst>
+                                    <p:set>
+                                      <p:cBhvr>
+                                        <p:cTn id="13" dur="1" fill="hold">
+                                          <p:stCondLst>
+                                            <p:cond delay="0"/>
+                                          </p:stCondLst>
+                                        </p:cTn>
+                                        <p:tgtEl>
+                                          <p:spTgt spid="15"/>
+                                        </p:tgtEl>
+                                        <p:attrNameLst>
+                                          <p:attrName>style.visibility</p:attrName>
+                                        </p:attrNameLst>
+                                      </p:cBhvr>
+                                      <p:to>
+                                        <p:strVal val="visible"/>
+                                      </p:to>
+                                    </p:set>
+                                    <p:animEffect transition="in" filter="fade">
+                                      <p:cBhvr>
+                                        <p:cTn id="14" dur="1000"/>
+                                        <p:tgtEl>
+                                          <p:spTgt spid="15"/>
+                                        </p:tgtEl>
+                                      </p:cBhvr>
+                                    </p:animEffect>
+                                    <p:anim calcmode="lin" valueType="num">
+                                      <p:cBhvr>
+                                        <p:cTn id="15" dur="1000" fill="hold"/>
+                                        <p:tgtEl>
+                                          <p:spTgt spid="15"/>
+                                        </p:tgtEl>
+                                        <p:attrNameLst>
+                                          <p:attrName>ppt_x</p:attrName>
+                                        </p:attrNameLst>
+                                      </p:cBhvr>
+                                      <p:tavLst>
+                                        <p:tav tm="0">
+                                          <p:val>
+                                            <p:strVal val="#ppt_x"/>
+                                          </p:val>
+                                        </p:tav>
+                                        <p:tav tm="100000">
+                                          <p:val>
+                                            <p:strVal val="#ppt_x"/>
+                                          </p:val>
+                                        </p:tav>
+                                      </p:tavLst>
+                                    </p:anim>
+                                    <p:anim calcmode="lin" valueType="num">
+                                      <p:cBhvr>
+                                        <p:cTn id="16" dur="1000" fill="hold"/>
+                                        <p:tgtEl>
+                                          <p:spTgt spid="15"/>
                                         </p:tgtEl>
                                         <p:attrNameLst>
                                           <p:attrName>ppt_y</p:attrName>
@@ -17434,15 +20014,143 @@
       </p:par>
     </p:tnLst>
     <p:bldLst>
-      <p:bldP spid="53" grpId="0"/>
-      <p:bldP spid="13" grpId="0"/>
       <p:bldP spid="14" grpId="0"/>
+      <p:bldP spid="15" grpId="0"/>
     </p:bldLst>
   </p:timing>
 </p:sld>
 </file>
 
-<file path=ppt/slides/slide4.xml><?xml version="1.0" encoding="utf-8"?>
+<file path=ppt/slides/slide5.xml><?xml version="1.0" encoding="utf-8"?>
+<p:sld xmlns:a="http://schemas.openxmlformats.org/drawingml/2006/main" xmlns:r="http://schemas.openxmlformats.org/officeDocument/2006/relationships" xmlns:p="http://schemas.openxmlformats.org/presentationml/2006/main">
+  <p:cSld>
+    <p:spTree>
+      <p:nvGrpSpPr>
+        <p:cNvPr id="1" name=""/>
+        <p:cNvGrpSpPr/>
+        <p:nvPr/>
+      </p:nvGrpSpPr>
+      <p:grpSpPr>
+        <a:xfrm>
+          <a:off x="0" y="0"/>
+          <a:ext cx="0" cy="0"/>
+          <a:chOff x="0" y="0"/>
+          <a:chExt cx="0" cy="0"/>
+        </a:xfrm>
+      </p:grpSpPr>
+      <p:sp>
+        <p:nvSpPr>
+          <p:cNvPr id="5" name="Title 1">
+            <a:extLst>
+              <a:ext uri="{FF2B5EF4-FFF2-40B4-BE49-F238E27FC236}">
+                <a16:creationId xmlns:a16="http://schemas.microsoft.com/office/drawing/2014/main" id="{C20C253D-C7DD-7144-B794-69287D36BF83}"/>
+              </a:ext>
+            </a:extLst>
+          </p:cNvPr>
+          <p:cNvSpPr txBox="1">
+            <a:spLocks/>
+          </p:cNvSpPr>
+          <p:nvPr/>
+        </p:nvSpPr>
+        <p:spPr>
+          <a:xfrm>
+            <a:off x="-146303" y="-36576"/>
+            <a:ext cx="3499103" cy="1138238"/>
+          </a:xfrm>
+          <a:prstGeom prst="rect">
+            <a:avLst/>
+          </a:prstGeom>
+        </p:spPr>
+        <p:txBody>
+          <a:bodyPr vert="horz" lIns="91440" tIns="45720" rIns="91440" bIns="45720" rtlCol="0" anchor="ctr">
+            <a:normAutofit fontScale="97500"/>
+          </a:bodyPr>
+          <a:lstStyle>
+            <a:lvl1pPr algn="l" defTabSz="914400" rtl="0" eaLnBrk="1" latinLnBrk="0" hangingPunct="1">
+              <a:lnSpc>
+                <a:spcPct val="90000"/>
+              </a:lnSpc>
+              <a:spcBef>
+                <a:spcPct val="0"/>
+              </a:spcBef>
+              <a:buNone/>
+              <a:defRPr sz="4400" kern="1200">
+                <a:solidFill>
+                  <a:schemeClr val="tx1"/>
+                </a:solidFill>
+                <a:latin typeface="+mj-lt"/>
+                <a:ea typeface="+mj-ea"/>
+                <a:cs typeface="+mj-cs"/>
+              </a:defRPr>
+            </a:lvl1pPr>
+          </a:lstStyle>
+          <a:p>
+            <a:pPr algn="ctr"/>
+            <a:r>
+              <a:rPr lang="en-AU" sz="3200" b="1" dirty="0">
+                <a:solidFill>
+                  <a:schemeClr val="bg1"/>
+                </a:solidFill>
+                <a:latin typeface="Arial" pitchFamily="34" charset="0"/>
+                <a:ea typeface="Tahoma" panose="020B0604030504040204" pitchFamily="34" charset="0"/>
+                <a:cs typeface="Arial" pitchFamily="34" charset="0"/>
+              </a:rPr>
+              <a:t>QRCODE</a:t>
+            </a:r>
+          </a:p>
+        </p:txBody>
+      </p:sp>
+      <p:pic>
+        <p:nvPicPr>
+          <p:cNvPr id="2" name="Picture 1"/>
+          <p:cNvPicPr>
+            <a:picLocks noChangeAspect="1"/>
+          </p:cNvPicPr>
+          <p:nvPr/>
+        </p:nvPicPr>
+        <p:blipFill>
+          <a:blip r:embed="rId3">
+            <a:extLst>
+              <a:ext uri="{28A0092B-C50C-407E-A947-70E740481C1C}">
+                <a14:useLocalDpi xmlns:a14="http://schemas.microsoft.com/office/drawing/2010/main" val="0"/>
+              </a:ext>
+            </a:extLst>
+          </a:blip>
+          <a:stretch>
+            <a:fillRect/>
+          </a:stretch>
+        </p:blipFill>
+        <p:spPr>
+          <a:xfrm>
+            <a:off x="1378857" y="1101662"/>
+            <a:ext cx="9666514" cy="5675375"/>
+          </a:xfrm>
+          <a:prstGeom prst="rect">
+            <a:avLst/>
+          </a:prstGeom>
+        </p:spPr>
+      </p:pic>
+    </p:spTree>
+    <p:extLst>
+      <p:ext uri="{BB962C8B-B14F-4D97-AF65-F5344CB8AC3E}">
+        <p14:creationId xmlns:p14="http://schemas.microsoft.com/office/powerpoint/2010/main" val="2048960842"/>
+      </p:ext>
+    </p:extLst>
+  </p:cSld>
+  <p:clrMapOvr>
+    <a:masterClrMapping/>
+  </p:clrMapOvr>
+  <p:timing>
+    <p:tnLst>
+      <p:par>
+        <p:cTn id="1" dur="indefinite" restart="never" nodeType="tmRoot"/>
+      </p:par>
+    </p:tnLst>
+  </p:timing>
+</p:sld>
+</file>
+
+<file path=ppt/slides/slide6.xml><?xml version="1.0" encoding="utf-8"?>
 <p:sld xmlns:a="http://schemas.openxmlformats.org/drawingml/2006/main" xmlns:r="http://schemas.openxmlformats.org/officeDocument/2006/relationships" xmlns:p="http://schemas.openxmlformats.org/presentationml/2006/main">
   <p:cSld>
     <p:spTree>
@@ -19020,7 +21728,7 @@
           <p:nvPr/>
         </p:nvPicPr>
         <p:blipFill>
-          <a:blip r:embed="rId2">
+          <a:blip r:embed="rId3">
             <a:extLst>
               <a:ext uri="{28A0092B-C50C-407E-A947-70E740481C1C}">
                 <a14:useLocalDpi xmlns:a14="http://schemas.microsoft.com/office/drawing/2010/main" val="0"/>
@@ -19649,10 +22357,17 @@
   <p:clrMapOvr>
     <a:masterClrMapping/>
   </p:clrMapOvr>
+  <p:timing>
+    <p:tnLst>
+      <p:par>
+        <p:cTn id="1" dur="indefinite" restart="never" nodeType="tmRoot"/>
+      </p:par>
+    </p:tnLst>
+  </p:timing>
 </p:sld>
 </file>
 
-<file path=ppt/slides/slide5.xml><?xml version="1.0" encoding="utf-8"?>
+<file path=ppt/slides/slide7.xml><?xml version="1.0" encoding="utf-8"?>
 <p:sld xmlns:a="http://schemas.openxmlformats.org/drawingml/2006/main" xmlns:r="http://schemas.openxmlformats.org/officeDocument/2006/relationships" xmlns:p="http://schemas.openxmlformats.org/presentationml/2006/main">
   <p:cSld>
     <p:spTree>
@@ -21561,7 +24276,136 @@
 </p:sld>
 </file>
 
-<file path=ppt/slides/slide6.xml><?xml version="1.0" encoding="utf-8"?>
+<file path=ppt/slides/slide8.xml><?xml version="1.0" encoding="utf-8"?>
+<p:sld xmlns:a="http://schemas.openxmlformats.org/drawingml/2006/main" xmlns:r="http://schemas.openxmlformats.org/officeDocument/2006/relationships" xmlns:p="http://schemas.openxmlformats.org/presentationml/2006/main">
+  <p:cSld>
+    <p:spTree>
+      <p:nvGrpSpPr>
+        <p:cNvPr id="1" name=""/>
+        <p:cNvGrpSpPr/>
+        <p:nvPr/>
+      </p:nvGrpSpPr>
+      <p:grpSpPr>
+        <a:xfrm>
+          <a:off x="0" y="0"/>
+          <a:ext cx="0" cy="0"/>
+          <a:chOff x="0" y="0"/>
+          <a:chExt cx="0" cy="0"/>
+        </a:xfrm>
+      </p:grpSpPr>
+      <p:sp>
+        <p:nvSpPr>
+          <p:cNvPr id="5" name="Title 1">
+            <a:extLst>
+              <a:ext uri="{FF2B5EF4-FFF2-40B4-BE49-F238E27FC236}">
+                <a16:creationId xmlns:a16="http://schemas.microsoft.com/office/drawing/2014/main" id="{C20C253D-C7DD-7144-B794-69287D36BF83}"/>
+              </a:ext>
+            </a:extLst>
+          </p:cNvPr>
+          <p:cNvSpPr txBox="1">
+            <a:spLocks/>
+          </p:cNvSpPr>
+          <p:nvPr/>
+        </p:nvSpPr>
+        <p:spPr>
+          <a:xfrm>
+            <a:off x="-146304" y="-36576"/>
+            <a:ext cx="5772150" cy="1138238"/>
+          </a:xfrm>
+          <a:prstGeom prst="rect">
+            <a:avLst/>
+          </a:prstGeom>
+        </p:spPr>
+        <p:txBody>
+          <a:bodyPr vert="horz" lIns="91440" tIns="45720" rIns="91440" bIns="45720" rtlCol="0" anchor="ctr">
+            <a:normAutofit fontScale="97500"/>
+          </a:bodyPr>
+          <a:lstStyle>
+            <a:lvl1pPr algn="l" defTabSz="914400" rtl="0" eaLnBrk="1" latinLnBrk="0" hangingPunct="1">
+              <a:lnSpc>
+                <a:spcPct val="90000"/>
+              </a:lnSpc>
+              <a:spcBef>
+                <a:spcPct val="0"/>
+              </a:spcBef>
+              <a:buNone/>
+              <a:defRPr sz="4400" kern="1200">
+                <a:solidFill>
+                  <a:schemeClr val="tx1"/>
+                </a:solidFill>
+                <a:latin typeface="+mj-lt"/>
+                <a:ea typeface="+mj-ea"/>
+                <a:cs typeface="+mj-cs"/>
+              </a:defRPr>
+            </a:lvl1pPr>
+          </a:lstStyle>
+          <a:p>
+            <a:pPr algn="ctr"/>
+            <a:r>
+              <a:rPr lang="en-AU" sz="3200" b="1" dirty="0">
+                <a:solidFill>
+                  <a:schemeClr val="bg1"/>
+                </a:solidFill>
+                <a:latin typeface="Arial" pitchFamily="34" charset="0"/>
+                <a:ea typeface="Tahoma" panose="020B0604030504040204" pitchFamily="34" charset="0"/>
+                <a:cs typeface="Arial" pitchFamily="34" charset="0"/>
+              </a:rPr>
+              <a:t>HOÀN TRẢ (REFUND)</a:t>
+            </a:r>
+          </a:p>
+        </p:txBody>
+      </p:sp>
+      <p:pic>
+        <p:nvPicPr>
+          <p:cNvPr id="2" name="Picture 1"/>
+          <p:cNvPicPr>
+            <a:picLocks noChangeAspect="1"/>
+          </p:cNvPicPr>
+          <p:nvPr/>
+        </p:nvPicPr>
+        <p:blipFill>
+          <a:blip r:embed="rId2">
+            <a:extLst>
+              <a:ext uri="{28A0092B-C50C-407E-A947-70E740481C1C}">
+                <a14:useLocalDpi xmlns:a14="http://schemas.microsoft.com/office/drawing/2010/main" val="0"/>
+              </a:ext>
+            </a:extLst>
+          </a:blip>
+          <a:stretch>
+            <a:fillRect/>
+          </a:stretch>
+        </p:blipFill>
+        <p:spPr>
+          <a:xfrm>
+            <a:off x="1509485" y="1659327"/>
+            <a:ext cx="9301716" cy="4886616"/>
+          </a:xfrm>
+          <a:prstGeom prst="rect">
+            <a:avLst/>
+          </a:prstGeom>
+        </p:spPr>
+      </p:pic>
+    </p:spTree>
+    <p:extLst>
+      <p:ext uri="{BB962C8B-B14F-4D97-AF65-F5344CB8AC3E}">
+        <p14:creationId xmlns:p14="http://schemas.microsoft.com/office/powerpoint/2010/main" val="1408146065"/>
+      </p:ext>
+    </p:extLst>
+  </p:cSld>
+  <p:clrMapOvr>
+    <a:masterClrMapping/>
+  </p:clrMapOvr>
+  <p:timing>
+    <p:tnLst>
+      <p:par>
+        <p:cTn id="1" dur="indefinite" restart="never" nodeType="tmRoot"/>
+      </p:par>
+    </p:tnLst>
+  </p:timing>
+</p:sld>
+</file>
+
+<file path=ppt/slides/slide9.xml><?xml version="1.0" encoding="utf-8"?>
 <p:sld xmlns:a="http://schemas.openxmlformats.org/drawingml/2006/main" xmlns:r="http://schemas.openxmlformats.org/officeDocument/2006/relationships" xmlns:p="http://schemas.openxmlformats.org/presentationml/2006/main">
   <p:cSld>
     <p:spTree>
@@ -22240,6 +25084,10 @@
               <a:rPr lang="vi-VN" b="1" dirty="0"/>
               <a:t>Người bán chỉ có thể thực hiện một giao dịch 'Void Purchase' trên</a:t>
             </a:r>
+            <a:r>
+              <a:rPr lang="en-US" b="1" dirty="0"/>
+              <a:t/>
+            </a:r>
             <a:br>
               <a:rPr lang="en-US" b="1" dirty="0"/>
             </a:br>
@@ -22541,7 +25389,7 @@
           <p:nvPr/>
         </p:nvPicPr>
         <p:blipFill>
-          <a:blip r:embed="rId2">
+          <a:blip r:embed="rId3">
             <a:extLst>
               <a:ext uri="{28A0092B-C50C-407E-A947-70E740481C1C}">
                 <a14:useLocalDpi xmlns:a14="http://schemas.microsoft.com/office/drawing/2010/main" val="0"/>
@@ -22572,6 +25420,13 @@
   <p:clrMapOvr>
     <a:masterClrMapping/>
   </p:clrMapOvr>
+  <p:timing>
+    <p:tnLst>
+      <p:par>
+        <p:cTn id="1" dur="indefinite" restart="never" nodeType="tmRoot"/>
+      </p:par>
+    </p:tnLst>
+  </p:timing>
 </p:sld>
 </file>
 

</xml_diff>